<commit_message>
code and plot image changes
</commit_message>
<xml_diff>
--- a/SIGCOMM_Figures/basic_lte_simple3.pptx
+++ b/SIGCOMM_Figures/basic_lte_simple3.pptx
@@ -208,7 +208,7 @@
           <a:p>
             <a:fld id="{B327E4A7-847A-484E-B4AC-DC353DA4CE69}" type="datetimeFigureOut">
               <a:rPr lang="en-US" smtClean="0"/>
-              <a:t>1/30/18</a:t>
+              <a:t>6/21/18</a:t>
             </a:fld>
             <a:endParaRPr lang="en-US"/>
           </a:p>
@@ -272,38 +272,37 @@
           <a:p>
             <a:pPr lvl="0"/>
             <a:r>
-              <a:rPr lang="en-US" smtClean="0"/>
+              <a:rPr lang="en-US"/>
               <a:t>Click to edit Master text styles</a:t>
             </a:r>
           </a:p>
           <a:p>
             <a:pPr lvl="1"/>
             <a:r>
-              <a:rPr lang="en-US" smtClean="0"/>
+              <a:rPr lang="en-US"/>
               <a:t>Second level</a:t>
             </a:r>
           </a:p>
           <a:p>
             <a:pPr lvl="2"/>
             <a:r>
-              <a:rPr lang="en-US" smtClean="0"/>
+              <a:rPr lang="en-US"/>
               <a:t>Third level</a:t>
             </a:r>
           </a:p>
           <a:p>
             <a:pPr lvl="3"/>
             <a:r>
-              <a:rPr lang="en-US" smtClean="0"/>
+              <a:rPr lang="en-US"/>
               <a:t>Fourth level</a:t>
             </a:r>
           </a:p>
           <a:p>
             <a:pPr lvl="4"/>
             <a:r>
-              <a:rPr lang="en-US" smtClean="0"/>
+              <a:rPr lang="en-US"/>
               <a:t>Fifth level</a:t>
             </a:r>
-            <a:endParaRPr lang="en-US"/>
           </a:p>
         </p:txBody>
       </p:sp>
@@ -744,7 +743,7 @@
           <a:p>
             <a:fld id="{A55F4D1E-AB8E-2A4F-BA35-32ACE32DE7C0}" type="datetimeFigureOut">
               <a:rPr lang="en-US" smtClean="0"/>
-              <a:t>1/30/18</a:t>
+              <a:t>6/21/18</a:t>
             </a:fld>
             <a:endParaRPr lang="en-US"/>
           </a:p>
@@ -912,7 +911,7 @@
           <a:p>
             <a:fld id="{A55F4D1E-AB8E-2A4F-BA35-32ACE32DE7C0}" type="datetimeFigureOut">
               <a:rPr lang="en-US" smtClean="0"/>
-              <a:t>1/30/18</a:t>
+              <a:t>6/21/18</a:t>
             </a:fld>
             <a:endParaRPr lang="en-US"/>
           </a:p>
@@ -1090,7 +1089,7 @@
           <a:p>
             <a:fld id="{A55F4D1E-AB8E-2A4F-BA35-32ACE32DE7C0}" type="datetimeFigureOut">
               <a:rPr lang="en-US" smtClean="0"/>
-              <a:t>1/30/18</a:t>
+              <a:t>6/21/18</a:t>
             </a:fld>
             <a:endParaRPr lang="en-US"/>
           </a:p>
@@ -1258,7 +1257,7 @@
           <a:p>
             <a:fld id="{A55F4D1E-AB8E-2A4F-BA35-32ACE32DE7C0}" type="datetimeFigureOut">
               <a:rPr lang="en-US" smtClean="0"/>
-              <a:t>1/30/18</a:t>
+              <a:t>6/21/18</a:t>
             </a:fld>
             <a:endParaRPr lang="en-US"/>
           </a:p>
@@ -1503,7 +1502,7 @@
           <a:p>
             <a:fld id="{A55F4D1E-AB8E-2A4F-BA35-32ACE32DE7C0}" type="datetimeFigureOut">
               <a:rPr lang="en-US" smtClean="0"/>
-              <a:t>1/30/18</a:t>
+              <a:t>6/21/18</a:t>
             </a:fld>
             <a:endParaRPr lang="en-US"/>
           </a:p>
@@ -1788,7 +1787,7 @@
           <a:p>
             <a:fld id="{A55F4D1E-AB8E-2A4F-BA35-32ACE32DE7C0}" type="datetimeFigureOut">
               <a:rPr lang="en-US" smtClean="0"/>
-              <a:t>1/30/18</a:t>
+              <a:t>6/21/18</a:t>
             </a:fld>
             <a:endParaRPr lang="en-US"/>
           </a:p>
@@ -2207,7 +2206,7 @@
           <a:p>
             <a:fld id="{A55F4D1E-AB8E-2A4F-BA35-32ACE32DE7C0}" type="datetimeFigureOut">
               <a:rPr lang="en-US" smtClean="0"/>
-              <a:t>1/30/18</a:t>
+              <a:t>6/21/18</a:t>
             </a:fld>
             <a:endParaRPr lang="en-US"/>
           </a:p>
@@ -2324,7 +2323,7 @@
           <a:p>
             <a:fld id="{A55F4D1E-AB8E-2A4F-BA35-32ACE32DE7C0}" type="datetimeFigureOut">
               <a:rPr lang="en-US" smtClean="0"/>
-              <a:t>1/30/18</a:t>
+              <a:t>6/21/18</a:t>
             </a:fld>
             <a:endParaRPr lang="en-US"/>
           </a:p>
@@ -2419,7 +2418,7 @@
           <a:p>
             <a:fld id="{A55F4D1E-AB8E-2A4F-BA35-32ACE32DE7C0}" type="datetimeFigureOut">
               <a:rPr lang="en-US" smtClean="0"/>
-              <a:t>1/30/18</a:t>
+              <a:t>6/21/18</a:t>
             </a:fld>
             <a:endParaRPr lang="en-US"/>
           </a:p>
@@ -2694,7 +2693,7 @@
           <a:p>
             <a:fld id="{A55F4D1E-AB8E-2A4F-BA35-32ACE32DE7C0}" type="datetimeFigureOut">
               <a:rPr lang="en-US" smtClean="0"/>
-              <a:t>1/30/18</a:t>
+              <a:t>6/21/18</a:t>
             </a:fld>
             <a:endParaRPr lang="en-US"/>
           </a:p>
@@ -2946,7 +2945,7 @@
           <a:p>
             <a:fld id="{A55F4D1E-AB8E-2A4F-BA35-32ACE32DE7C0}" type="datetimeFigureOut">
               <a:rPr lang="en-US" smtClean="0"/>
-              <a:t>1/30/18</a:t>
+              <a:t>6/21/18</a:t>
             </a:fld>
             <a:endParaRPr lang="en-US"/>
           </a:p>
@@ -3157,7 +3156,7 @@
           <a:p>
             <a:fld id="{A55F4D1E-AB8E-2A4F-BA35-32ACE32DE7C0}" type="datetimeFigureOut">
               <a:rPr lang="en-US" smtClean="0"/>
-              <a:t>1/30/18</a:t>
+              <a:t>6/21/18</a:t>
             </a:fld>
             <a:endParaRPr lang="en-US"/>
           </a:p>
@@ -3532,908 +3531,75 @@
           <a:chExt cx="0" cy="0"/>
         </a:xfrm>
       </p:grpSpPr>
-      <p:cxnSp>
-        <p:nvCxnSpPr>
-          <p:cNvPr id="123" name="Straight Arrow Connector 122"/>
-          <p:cNvCxnSpPr/>
-          <p:nvPr/>
-        </p:nvCxnSpPr>
-        <p:spPr>
-          <a:xfrm flipH="1">
-            <a:off x="1766895" y="630124"/>
-            <a:ext cx="292781" cy="0"/>
-          </a:xfrm>
-          <a:prstGeom prst="straightConnector1">
-            <a:avLst/>
-          </a:prstGeom>
-          <a:ln w="6350">
-            <a:solidFill>
-              <a:schemeClr val="accent2"/>
-            </a:solidFill>
-            <a:prstDash val="dash"/>
-            <a:headEnd type="none" w="sm" len="sm"/>
-            <a:tailEnd type="none" w="sm" len="sm"/>
-          </a:ln>
-          <a:effectLst/>
-        </p:spPr>
-        <p:style>
-          <a:lnRef idx="2">
-            <a:schemeClr val="accent1"/>
-          </a:lnRef>
-          <a:fillRef idx="0">
-            <a:schemeClr val="accent1"/>
-          </a:fillRef>
-          <a:effectRef idx="1">
-            <a:schemeClr val="accent1"/>
-          </a:effectRef>
-          <a:fontRef idx="minor">
-            <a:schemeClr val="tx1"/>
-          </a:fontRef>
-        </p:style>
-      </p:cxnSp>
-      <p:sp>
-        <p:nvSpPr>
-          <p:cNvPr id="241" name="Rectangle 240"/>
-          <p:cNvSpPr/>
-          <p:nvPr/>
-        </p:nvSpPr>
-        <p:spPr>
-          <a:xfrm>
-            <a:off x="1443091" y="144526"/>
-            <a:ext cx="314101" cy="165794"/>
-          </a:xfrm>
-          <a:prstGeom prst="rect">
-            <a:avLst/>
-          </a:prstGeom>
-          <a:ln w="6350" cmpd="sng">
-            <a:solidFill>
-              <a:srgbClr val="000000"/>
-            </a:solidFill>
-          </a:ln>
-          <a:effectLst/>
-        </p:spPr>
-        <p:style>
-          <a:lnRef idx="2">
-            <a:schemeClr val="dk1"/>
-          </a:lnRef>
-          <a:fillRef idx="1">
-            <a:schemeClr val="lt1"/>
-          </a:fillRef>
-          <a:effectRef idx="0">
-            <a:schemeClr val="dk1"/>
-          </a:effectRef>
-          <a:fontRef idx="minor">
-            <a:schemeClr val="dk1"/>
-          </a:fontRef>
-        </p:style>
-        <p:txBody>
-          <a:bodyPr lIns="39182" tIns="19591" rIns="39182" bIns="19591" spcCol="0" rtlCol="0" anchor="ctr"/>
-          <a:lstStyle/>
-          <a:p>
-            <a:pPr algn="ctr"/>
-            <a:endParaRPr lang="en-US" sz="600">
-              <a:latin typeface="Heiti SC Light" charset="-122"/>
-              <a:ea typeface="Heiti SC Light" charset="-122"/>
-              <a:cs typeface="Heiti SC Light" charset="-122"/>
-            </a:endParaRPr>
-          </a:p>
-        </p:txBody>
-      </p:sp>
-      <p:cxnSp>
-        <p:nvCxnSpPr>
-          <p:cNvPr id="245" name="Straight Connector 244"/>
-          <p:cNvCxnSpPr>
-            <a:stCxn id="241" idx="3"/>
-            <a:endCxn id="105" idx="1"/>
-          </p:cNvCxnSpPr>
-          <p:nvPr/>
-        </p:nvCxnSpPr>
-        <p:spPr>
-          <a:xfrm>
-            <a:off x="1757192" y="227423"/>
-            <a:ext cx="270711" cy="802"/>
-          </a:xfrm>
-          <a:prstGeom prst="line">
-            <a:avLst/>
-          </a:prstGeom>
-          <a:ln w="6350" cmpd="sng">
-            <a:solidFill>
-              <a:schemeClr val="accent2"/>
-            </a:solidFill>
-            <a:prstDash val="dash"/>
-          </a:ln>
-          <a:effectLst/>
-        </p:spPr>
-        <p:style>
-          <a:lnRef idx="2">
-            <a:schemeClr val="accent1"/>
-          </a:lnRef>
-          <a:fillRef idx="0">
-            <a:schemeClr val="accent1"/>
-          </a:fillRef>
-          <a:effectRef idx="1">
-            <a:schemeClr val="accent1"/>
-          </a:effectRef>
-          <a:fontRef idx="minor">
-            <a:schemeClr val="tx1"/>
-          </a:fontRef>
-        </p:style>
-      </p:cxnSp>
-      <p:cxnSp>
-        <p:nvCxnSpPr>
-          <p:cNvPr id="247" name="Straight Connector 246"/>
-          <p:cNvCxnSpPr>
-            <a:stCxn id="44" idx="0"/>
-            <a:endCxn id="241" idx="2"/>
-          </p:cNvCxnSpPr>
-          <p:nvPr/>
-        </p:nvCxnSpPr>
-        <p:spPr>
-          <a:xfrm flipV="1">
-            <a:off x="1600141" y="310320"/>
-            <a:ext cx="1" cy="250899"/>
-          </a:xfrm>
-          <a:prstGeom prst="line">
-            <a:avLst/>
-          </a:prstGeom>
-          <a:ln w="6350" cmpd="sng">
-            <a:solidFill>
-              <a:schemeClr val="accent2"/>
-            </a:solidFill>
-            <a:prstDash val="dash"/>
-          </a:ln>
-          <a:effectLst/>
-        </p:spPr>
-        <p:style>
-          <a:lnRef idx="2">
-            <a:schemeClr val="accent1"/>
-          </a:lnRef>
-          <a:fillRef idx="0">
-            <a:schemeClr val="accent1"/>
-          </a:fillRef>
-          <a:effectRef idx="1">
-            <a:schemeClr val="accent1"/>
-          </a:effectRef>
-          <a:fontRef idx="minor">
-            <a:schemeClr val="tx1"/>
-          </a:fontRef>
-        </p:style>
-      </p:cxnSp>
-      <p:sp>
-        <p:nvSpPr>
-          <p:cNvPr id="258" name="TextBox 257"/>
-          <p:cNvSpPr txBox="1"/>
-          <p:nvPr/>
-        </p:nvSpPr>
-        <p:spPr>
-          <a:xfrm>
-            <a:off x="1344461" y="132217"/>
-            <a:ext cx="504315" cy="184666"/>
-          </a:xfrm>
-          <a:prstGeom prst="rect">
-            <a:avLst/>
-          </a:prstGeom>
-          <a:noFill/>
-        </p:spPr>
-        <p:txBody>
-          <a:bodyPr wrap="square" rtlCol="0">
-            <a:spAutoFit/>
-          </a:bodyPr>
-          <a:lstStyle/>
-          <a:p>
-            <a:pPr algn="ctr"/>
-            <a:r>
-              <a:rPr lang="en-US" sz="600" dirty="0">
-                <a:latin typeface="Heiti SC Light" charset="-122"/>
-                <a:ea typeface="Heiti SC Light" charset="-122"/>
-                <a:cs typeface="Heiti SC Light" charset="-122"/>
-              </a:rPr>
-              <a:t>MME</a:t>
-            </a:r>
-            <a:endParaRPr lang="en-US" sz="600" baseline="-25000" dirty="0">
-              <a:latin typeface="Heiti SC Light" charset="-122"/>
-              <a:ea typeface="Heiti SC Light" charset="-122"/>
-              <a:cs typeface="Heiti SC Light" charset="-122"/>
-            </a:endParaRPr>
-          </a:p>
-        </p:txBody>
-      </p:sp>
       <p:grpSp>
         <p:nvGrpSpPr>
-          <p:cNvPr id="264" name="Group 263"/>
+          <p:cNvPr id="4" name="Group 3">
+            <a:extLst>
+              <a:ext uri="{FF2B5EF4-FFF2-40B4-BE49-F238E27FC236}">
+                <a16:creationId xmlns:a16="http://schemas.microsoft.com/office/drawing/2014/main" id="{0B2EBFAF-9F1A-0647-B961-8BCF7792EC50}"/>
+              </a:ext>
+            </a:extLst>
+          </p:cNvPr>
           <p:cNvGrpSpPr/>
           <p:nvPr/>
         </p:nvGrpSpPr>
         <p:grpSpPr>
           <a:xfrm>
-            <a:off x="17249" y="26575"/>
-            <a:ext cx="731407" cy="729957"/>
-            <a:chOff x="42058" y="13100"/>
-            <a:chExt cx="731407" cy="729957"/>
+            <a:off x="66675" y="-25386"/>
+            <a:ext cx="2805796" cy="898511"/>
+            <a:chOff x="17249" y="-25386"/>
+            <a:chExt cx="2951710" cy="809841"/>
           </a:xfrm>
         </p:grpSpPr>
+        <p:cxnSp>
+          <p:nvCxnSpPr>
+            <p:cNvPr id="123" name="Straight Arrow Connector 122"/>
+            <p:cNvCxnSpPr/>
+            <p:nvPr/>
+          </p:nvCxnSpPr>
+          <p:spPr>
+            <a:xfrm flipH="1">
+              <a:off x="1766895" y="630124"/>
+              <a:ext cx="292781" cy="0"/>
+            </a:xfrm>
+            <a:prstGeom prst="straightConnector1">
+              <a:avLst/>
+            </a:prstGeom>
+            <a:ln w="6350">
+              <a:solidFill>
+                <a:schemeClr val="accent2"/>
+              </a:solidFill>
+              <a:prstDash val="dash"/>
+              <a:headEnd type="none" w="sm" len="sm"/>
+              <a:tailEnd type="none" w="sm" len="sm"/>
+            </a:ln>
+            <a:effectLst/>
+          </p:spPr>
+          <p:style>
+            <a:lnRef idx="2">
+              <a:schemeClr val="accent1"/>
+            </a:lnRef>
+            <a:fillRef idx="0">
+              <a:schemeClr val="accent1"/>
+            </a:fillRef>
+            <a:effectRef idx="1">
+              <a:schemeClr val="accent1"/>
+            </a:effectRef>
+            <a:fontRef idx="minor">
+              <a:schemeClr val="tx1"/>
+            </a:fontRef>
+          </p:style>
+        </p:cxnSp>
         <p:sp>
           <p:nvSpPr>
-            <p:cNvPr id="267" name="TextBox 266"/>
-            <p:cNvSpPr txBox="1"/>
-            <p:nvPr/>
-          </p:nvSpPr>
-          <p:spPr>
-            <a:xfrm>
-              <a:off x="42058" y="13100"/>
-              <a:ext cx="731407" cy="276999"/>
-            </a:xfrm>
-            <a:prstGeom prst="rect">
-              <a:avLst/>
-            </a:prstGeom>
-            <a:noFill/>
-          </p:spPr>
-          <p:txBody>
-            <a:bodyPr wrap="square" rtlCol="0">
-              <a:spAutoFit/>
-            </a:bodyPr>
-            <a:lstStyle/>
-            <a:p>
-              <a:pPr algn="ctr"/>
-              <a:r>
-                <a:rPr lang="en-US" sz="600" dirty="0">
-                  <a:latin typeface="Heiti SC Light" charset="-122"/>
-                  <a:ea typeface="Heiti SC Light" charset="-122"/>
-                  <a:cs typeface="Heiti SC Light" charset="-122"/>
-                </a:rPr>
-                <a:t>UEs / IoT Devices</a:t>
-              </a:r>
-            </a:p>
-          </p:txBody>
-        </p:sp>
-        <p:pic>
-          <p:nvPicPr>
-            <p:cNvPr id="268" name="Picture 267"/>
-            <p:cNvPicPr>
-              <a:picLocks noChangeAspect="1"/>
-            </p:cNvPicPr>
-            <p:nvPr/>
-          </p:nvPicPr>
-          <p:blipFill>
-            <a:blip r:embed="rId4">
-              <a:extLst>
-                <a:ext uri="{BEBA8EAE-BF5A-486C-A8C5-ECC9F3942E4B}">
-                  <a14:imgProps xmlns:a14="http://schemas.microsoft.com/office/drawing/2010/main">
-                    <a14:imgLayer r:embed="rId5">
-                      <a14:imgEffect>
-                        <a14:sharpenSoften amount="50000"/>
-                      </a14:imgEffect>
-                    </a14:imgLayer>
-                  </a14:imgProps>
-                </a:ext>
-              </a:extLst>
-            </a:blip>
-            <a:stretch>
-              <a:fillRect/>
-            </a:stretch>
-          </p:blipFill>
-          <p:spPr>
-            <a:xfrm>
-              <a:off x="136793" y="354175"/>
-              <a:ext cx="258938" cy="93160"/>
-            </a:xfrm>
-            <a:prstGeom prst="rect">
-              <a:avLst/>
-            </a:prstGeom>
-          </p:spPr>
-        </p:pic>
-        <p:sp>
-          <p:nvSpPr>
-            <p:cNvPr id="269" name="Cloud 268"/>
+            <p:cNvPr id="241" name="Rectangle 240"/>
             <p:cNvSpPr/>
             <p:nvPr/>
           </p:nvSpPr>
           <p:spPr>
             <a:xfrm>
-              <a:off x="60031" y="272526"/>
-              <a:ext cx="596431" cy="470531"/>
-            </a:xfrm>
-            <a:prstGeom prst="cloud">
-              <a:avLst/>
-            </a:prstGeom>
-            <a:noFill/>
-            <a:ln w="6350">
-              <a:solidFill>
-                <a:schemeClr val="tx1">
-                  <a:lumMod val="85000"/>
-                  <a:lumOff val="15000"/>
-                </a:schemeClr>
-              </a:solidFill>
-            </a:ln>
-            <a:effectLst/>
-          </p:spPr>
-          <p:style>
-            <a:lnRef idx="2">
-              <a:schemeClr val="accent1">
-                <a:shade val="50000"/>
-              </a:schemeClr>
-            </a:lnRef>
-            <a:fillRef idx="1">
-              <a:schemeClr val="accent1"/>
-            </a:fillRef>
-            <a:effectRef idx="0">
-              <a:schemeClr val="accent1"/>
-            </a:effectRef>
-            <a:fontRef idx="minor">
-              <a:schemeClr val="lt1"/>
-            </a:fontRef>
-          </p:style>
-          <p:txBody>
-            <a:bodyPr rtlCol="0" anchor="ctr"/>
-            <a:lstStyle/>
-            <a:p>
-              <a:endParaRPr lang="en-US" sz="600">
-                <a:latin typeface="Heiti SC Light" charset="-122"/>
-                <a:ea typeface="Heiti SC Light" charset="-122"/>
-                <a:cs typeface="Heiti SC Light" charset="-122"/>
-              </a:endParaRPr>
-            </a:p>
-          </p:txBody>
-        </p:sp>
-        <p:pic>
-          <p:nvPicPr>
-            <p:cNvPr id="270" name="Picture 269"/>
-            <p:cNvPicPr>
-              <a:picLocks noChangeAspect="1"/>
-            </p:cNvPicPr>
-            <p:nvPr/>
-          </p:nvPicPr>
-          <p:blipFill>
-            <a:blip r:embed="rId6"/>
-            <a:stretch>
-              <a:fillRect/>
-            </a:stretch>
-          </p:blipFill>
-          <p:spPr>
-            <a:xfrm>
-              <a:off x="428766" y="519812"/>
-              <a:ext cx="44929" cy="102184"/>
-            </a:xfrm>
-            <a:prstGeom prst="rect">
-              <a:avLst/>
-            </a:prstGeom>
-          </p:spPr>
-        </p:pic>
-        <p:pic>
-          <p:nvPicPr>
-            <p:cNvPr id="271" name="Picture 270"/>
-            <p:cNvPicPr>
-              <a:picLocks noChangeAspect="1"/>
-            </p:cNvPicPr>
-            <p:nvPr/>
-          </p:nvPicPr>
-          <p:blipFill>
-            <a:blip r:embed="rId7">
-              <a:extLst>
-                <a:ext uri="{BEBA8EAE-BF5A-486C-A8C5-ECC9F3942E4B}">
-                  <a14:imgProps xmlns:a14="http://schemas.microsoft.com/office/drawing/2010/main">
-                    <a14:imgLayer r:embed="rId8">
-                      <a14:imgEffect>
-                        <a14:sharpenSoften amount="100000"/>
-                      </a14:imgEffect>
-                      <a14:imgEffect>
-                        <a14:colorTemperature colorTemp="4700"/>
-                      </a14:imgEffect>
-                    </a14:imgLayer>
-                  </a14:imgProps>
-                </a:ext>
-              </a:extLst>
-            </a:blip>
-            <a:stretch>
-              <a:fillRect/>
-            </a:stretch>
-          </p:blipFill>
-          <p:spPr>
-            <a:xfrm>
-              <a:off x="437275" y="355902"/>
-              <a:ext cx="44929" cy="102184"/>
-            </a:xfrm>
-            <a:prstGeom prst="rect">
-              <a:avLst/>
-            </a:prstGeom>
-          </p:spPr>
-        </p:pic>
-        <p:pic>
-          <p:nvPicPr>
-            <p:cNvPr id="272" name="Picture 271"/>
-            <p:cNvPicPr>
-              <a:picLocks noChangeAspect="1"/>
-            </p:cNvPicPr>
-            <p:nvPr/>
-          </p:nvPicPr>
-          <p:blipFill>
-            <a:blip r:embed="rId6"/>
-            <a:stretch>
-              <a:fillRect/>
-            </a:stretch>
-          </p:blipFill>
-          <p:spPr>
-            <a:xfrm>
-              <a:off x="516132" y="436424"/>
-              <a:ext cx="44929" cy="102184"/>
-            </a:xfrm>
-            <a:prstGeom prst="rect">
-              <a:avLst/>
-            </a:prstGeom>
-          </p:spPr>
-        </p:pic>
-        <p:pic>
-          <p:nvPicPr>
-            <p:cNvPr id="273" name="Picture 272"/>
-            <p:cNvPicPr>
-              <a:picLocks noChangeAspect="1"/>
-            </p:cNvPicPr>
-            <p:nvPr/>
-          </p:nvPicPr>
-          <p:blipFill>
-            <a:blip r:embed="rId9"/>
-            <a:stretch>
-              <a:fillRect/>
-            </a:stretch>
-          </p:blipFill>
-          <p:spPr>
-            <a:xfrm>
-              <a:off x="163145" y="433265"/>
-              <a:ext cx="253351" cy="252691"/>
-            </a:xfrm>
-            <a:prstGeom prst="rect">
-              <a:avLst/>
-            </a:prstGeom>
-          </p:spPr>
-        </p:pic>
-      </p:grpSp>
-      <p:grpSp>
-        <p:nvGrpSpPr>
-          <p:cNvPr id="9" name="Group 8"/>
-          <p:cNvGrpSpPr/>
-          <p:nvPr/>
-        </p:nvGrpSpPr>
-        <p:grpSpPr>
-          <a:xfrm>
-            <a:off x="846574" y="213023"/>
-            <a:ext cx="203105" cy="506461"/>
-            <a:chOff x="566019" y="-278101"/>
-            <a:chExt cx="203105" cy="506461"/>
-          </a:xfrm>
-        </p:grpSpPr>
-        <p:sp>
-          <p:nvSpPr>
-            <p:cNvPr id="60" name="Rectangle 59"/>
-            <p:cNvSpPr/>
-            <p:nvPr/>
-          </p:nvSpPr>
-          <p:spPr>
-            <a:xfrm>
-              <a:off x="566019" y="-278101"/>
-              <a:ext cx="203105" cy="506461"/>
-            </a:xfrm>
-            <a:prstGeom prst="rect">
-              <a:avLst/>
-            </a:prstGeom>
-            <a:ln w="6350" cmpd="sng">
-              <a:solidFill>
-                <a:schemeClr val="tx1"/>
-              </a:solidFill>
-              <a:prstDash val="dash"/>
-            </a:ln>
-          </p:spPr>
-          <p:style>
-            <a:lnRef idx="2">
-              <a:schemeClr val="dk1"/>
-            </a:lnRef>
-            <a:fillRef idx="1">
-              <a:schemeClr val="lt1"/>
-            </a:fillRef>
-            <a:effectRef idx="0">
-              <a:schemeClr val="dk1"/>
-            </a:effectRef>
-            <a:fontRef idx="minor">
-              <a:schemeClr val="dk1"/>
-            </a:fontRef>
-          </p:style>
-          <p:txBody>
-            <a:bodyPr rtlCol="0" anchor="ctr"/>
-            <a:lstStyle/>
-            <a:p>
-              <a:endParaRPr lang="en-US" sz="600" dirty="0">
-                <a:solidFill>
-                  <a:schemeClr val="tx1"/>
-                </a:solidFill>
-                <a:latin typeface="Heiti SC Light" charset="-122"/>
-                <a:ea typeface="Heiti SC Light" charset="-122"/>
-                <a:cs typeface="Heiti SC Light" charset="-122"/>
-              </a:endParaRPr>
-            </a:p>
-          </p:txBody>
-        </p:sp>
-        <p:grpSp>
-          <p:nvGrpSpPr>
-            <p:cNvPr id="8" name="Group 7"/>
-            <p:cNvGrpSpPr/>
-            <p:nvPr/>
-          </p:nvGrpSpPr>
-          <p:grpSpPr>
-            <a:xfrm>
-              <a:off x="630025" y="-263175"/>
-              <a:ext cx="73933" cy="485925"/>
-              <a:chOff x="630025" y="-263175"/>
-              <a:chExt cx="73933" cy="485925"/>
-            </a:xfrm>
-          </p:grpSpPr>
-          <p:graphicFrame>
-            <p:nvGraphicFramePr>
-              <p:cNvPr id="62" name="Object 8"/>
-              <p:cNvGraphicFramePr>
-                <a:graphicFrameLocks noChangeAspect="1"/>
-              </p:cNvGraphicFramePr>
-              <p:nvPr>
-                <p:extLst>
-                  <p:ext uri="{D42A27DB-BD31-4B8C-83A1-F6EECF244321}">
-                    <p14:modId xmlns:p14="http://schemas.microsoft.com/office/powerpoint/2010/main" val="2084861946"/>
-                  </p:ext>
-                </p:extLst>
-              </p:nvPr>
-            </p:nvGraphicFramePr>
-            <p:xfrm>
-              <a:off x="630450" y="-263175"/>
-              <a:ext cx="73508" cy="246772"/>
-            </p:xfrm>
-            <a:graphic>
-              <a:graphicData uri="http://schemas.openxmlformats.org/presentationml/2006/ole">
-                <mc:AlternateContent xmlns:mc="http://schemas.openxmlformats.org/markup-compatibility/2006">
-                  <mc:Choice xmlns:v="urn:schemas-microsoft-com:vml" Requires="v">
-                    <p:oleObj spid="_x0000_s1943" name="Visio" r:id="rId10" imgW="635000" imgH="1511300" progId="">
-                      <p:embed/>
-                    </p:oleObj>
-                  </mc:Choice>
-                  <mc:Fallback>
-                    <p:oleObj name="Visio" r:id="rId10" imgW="635000" imgH="1511300" progId="">
-                      <p:embed/>
-                      <p:pic>
-                        <p:nvPicPr>
-                          <p:cNvPr id="0" name=""/>
-                          <p:cNvPicPr>
-                            <a:picLocks noChangeAspect="1" noChangeArrowheads="1"/>
-                          </p:cNvPicPr>
-                          <p:nvPr/>
-                        </p:nvPicPr>
-                        <p:blipFill>
-                          <a:blip r:embed="rId11">
-                            <a:lum bright="-100000"/>
-                            <a:extLst>
-                              <a:ext uri="{28A0092B-C50C-407E-A947-70E740481C1C}">
-                                <a14:useLocalDpi xmlns:a14="http://schemas.microsoft.com/office/drawing/2010/main" val="0"/>
-                              </a:ext>
-                            </a:extLst>
-                          </a:blip>
-                          <a:srcRect/>
-                          <a:stretch>
-                            <a:fillRect/>
-                          </a:stretch>
-                        </p:blipFill>
-                        <p:spPr bwMode="auto">
-                          <a:xfrm>
-                            <a:off x="630450" y="-263175"/>
-                            <a:ext cx="73508" cy="246772"/>
-                          </a:xfrm>
-                          <a:prstGeom prst="rect">
-                            <a:avLst/>
-                          </a:prstGeom>
-                          <a:noFill/>
-                          <a:ln>
-                            <a:noFill/>
-                          </a:ln>
-                        </p:spPr>
-                      </p:pic>
-                    </p:oleObj>
-                  </mc:Fallback>
-                </mc:AlternateContent>
-              </a:graphicData>
-            </a:graphic>
-          </p:graphicFrame>
-          <p:graphicFrame>
-            <p:nvGraphicFramePr>
-              <p:cNvPr id="63" name="Object 8"/>
-              <p:cNvGraphicFramePr>
-                <a:graphicFrameLocks noChangeAspect="1"/>
-              </p:cNvGraphicFramePr>
-              <p:nvPr>
-                <p:extLst>
-                  <p:ext uri="{D42A27DB-BD31-4B8C-83A1-F6EECF244321}">
-                    <p14:modId xmlns:p14="http://schemas.microsoft.com/office/powerpoint/2010/main" val="116830518"/>
-                  </p:ext>
-                </p:extLst>
-              </p:nvPr>
-            </p:nvGraphicFramePr>
-            <p:xfrm>
-              <a:off x="630025" y="-24022"/>
-              <a:ext cx="73508" cy="246772"/>
-            </p:xfrm>
-            <a:graphic>
-              <a:graphicData uri="http://schemas.openxmlformats.org/presentationml/2006/ole">
-                <mc:AlternateContent xmlns:mc="http://schemas.openxmlformats.org/markup-compatibility/2006">
-                  <mc:Choice xmlns:v="urn:schemas-microsoft-com:vml" Requires="v">
-                    <p:oleObj spid="_x0000_s1944" name="Visio" r:id="rId12" imgW="635000" imgH="1511300" progId="">
-                      <p:embed/>
-                    </p:oleObj>
-                  </mc:Choice>
-                  <mc:Fallback>
-                    <p:oleObj name="Visio" r:id="rId12" imgW="635000" imgH="1511300" progId="">
-                      <p:embed/>
-                      <p:pic>
-                        <p:nvPicPr>
-                          <p:cNvPr id="0" name=""/>
-                          <p:cNvPicPr>
-                            <a:picLocks noChangeAspect="1" noChangeArrowheads="1"/>
-                          </p:cNvPicPr>
-                          <p:nvPr/>
-                        </p:nvPicPr>
-                        <p:blipFill>
-                          <a:blip r:embed="rId11">
-                            <a:lum bright="-100000"/>
-                            <a:extLst>
-                              <a:ext uri="{28A0092B-C50C-407E-A947-70E740481C1C}">
-                                <a14:useLocalDpi xmlns:a14="http://schemas.microsoft.com/office/drawing/2010/main" val="0"/>
-                              </a:ext>
-                            </a:extLst>
-                          </a:blip>
-                          <a:srcRect/>
-                          <a:stretch>
-                            <a:fillRect/>
-                          </a:stretch>
-                        </p:blipFill>
-                        <p:spPr bwMode="auto">
-                          <a:xfrm>
-                            <a:off x="630025" y="-24022"/>
-                            <a:ext cx="73508" cy="246772"/>
-                          </a:xfrm>
-                          <a:prstGeom prst="rect">
-                            <a:avLst/>
-                          </a:prstGeom>
-                          <a:noFill/>
-                          <a:ln>
-                            <a:noFill/>
-                          </a:ln>
-                        </p:spPr>
-                      </p:pic>
-                    </p:oleObj>
-                  </mc:Fallback>
-                </mc:AlternateContent>
-              </a:graphicData>
-            </a:graphic>
-          </p:graphicFrame>
-        </p:grpSp>
-      </p:grpSp>
-      <p:cxnSp>
-        <p:nvCxnSpPr>
-          <p:cNvPr id="68" name="Straight Connector 67"/>
-          <p:cNvCxnSpPr>
-            <a:stCxn id="62" idx="3"/>
-            <a:endCxn id="241" idx="1"/>
-          </p:cNvCxnSpPr>
-          <p:nvPr/>
-        </p:nvCxnSpPr>
-        <p:spPr>
-          <a:xfrm flipV="1">
-            <a:off x="984513" y="227423"/>
-            <a:ext cx="458578" cy="123912"/>
-          </a:xfrm>
-          <a:prstGeom prst="line">
-            <a:avLst/>
-          </a:prstGeom>
-          <a:ln w="6350" cmpd="sng">
-            <a:solidFill>
-              <a:schemeClr val="accent2"/>
-            </a:solidFill>
-            <a:prstDash val="dash"/>
-          </a:ln>
-          <a:effectLst/>
-        </p:spPr>
-        <p:style>
-          <a:lnRef idx="2">
-            <a:schemeClr val="accent1"/>
-          </a:lnRef>
-          <a:fillRef idx="0">
-            <a:schemeClr val="accent1"/>
-          </a:fillRef>
-          <a:effectRef idx="1">
-            <a:schemeClr val="accent1"/>
-          </a:effectRef>
-          <a:fontRef idx="minor">
-            <a:schemeClr val="tx1"/>
-          </a:fontRef>
-        </p:style>
-      </p:cxnSp>
-      <p:cxnSp>
-        <p:nvCxnSpPr>
-          <p:cNvPr id="75" name="Straight Connector 74"/>
-          <p:cNvCxnSpPr>
-            <a:stCxn id="63" idx="3"/>
-            <a:endCxn id="241" idx="1"/>
-          </p:cNvCxnSpPr>
-          <p:nvPr/>
-        </p:nvCxnSpPr>
-        <p:spPr>
-          <a:xfrm flipV="1">
-            <a:off x="984088" y="227423"/>
-            <a:ext cx="459003" cy="363065"/>
-          </a:xfrm>
-          <a:prstGeom prst="line">
-            <a:avLst/>
-          </a:prstGeom>
-          <a:ln w="6350" cmpd="sng">
-            <a:solidFill>
-              <a:schemeClr val="accent2"/>
-            </a:solidFill>
-            <a:prstDash val="dash"/>
-          </a:ln>
-          <a:effectLst/>
-        </p:spPr>
-        <p:style>
-          <a:lnRef idx="2">
-            <a:schemeClr val="accent1"/>
-          </a:lnRef>
-          <a:fillRef idx="0">
-            <a:schemeClr val="accent1"/>
-          </a:fillRef>
-          <a:effectRef idx="1">
-            <a:schemeClr val="accent1"/>
-          </a:effectRef>
-          <a:fontRef idx="minor">
-            <a:schemeClr val="tx1"/>
-          </a:fontRef>
-        </p:style>
-      </p:cxnSp>
-      <p:sp>
-        <p:nvSpPr>
-          <p:cNvPr id="265" name="Freeform 29"/>
-          <p:cNvSpPr>
-            <a:spLocks/>
-          </p:cNvSpPr>
-          <p:nvPr/>
-        </p:nvSpPr>
-        <p:spPr bwMode="auto">
-          <a:xfrm rot="15900000" flipH="1" flipV="1">
-            <a:off x="697879" y="351626"/>
-            <a:ext cx="45719" cy="298729"/>
-          </a:xfrm>
-          <a:custGeom>
-            <a:avLst/>
-            <a:gdLst>
-              <a:gd name="T0" fmla="*/ 2147483647 w 404"/>
-              <a:gd name="T1" fmla="*/ 2147483647 h 1294"/>
-              <a:gd name="T2" fmla="*/ 2147483647 w 404"/>
-              <a:gd name="T3" fmla="*/ 0 h 1294"/>
-              <a:gd name="T4" fmla="*/ 2147483647 w 404"/>
-              <a:gd name="T5" fmla="*/ 2147483647 h 1294"/>
-              <a:gd name="T6" fmla="*/ 0 w 404"/>
-              <a:gd name="T7" fmla="*/ 2147483647 h 1294"/>
-              <a:gd name="T8" fmla="*/ 2147483647 w 404"/>
-              <a:gd name="T9" fmla="*/ 2147483647 h 1294"/>
-              <a:gd name="T10" fmla="*/ 2147483647 w 404"/>
-              <a:gd name="T11" fmla="*/ 2147483647 h 1294"/>
-              <a:gd name="T12" fmla="*/ 2147483647 w 404"/>
-              <a:gd name="T13" fmla="*/ 2147483647 h 1294"/>
-              <a:gd name="T14" fmla="*/ 0 60000 65536"/>
-              <a:gd name="T15" fmla="*/ 0 60000 65536"/>
-              <a:gd name="T16" fmla="*/ 0 60000 65536"/>
-              <a:gd name="T17" fmla="*/ 0 60000 65536"/>
-              <a:gd name="T18" fmla="*/ 0 60000 65536"/>
-              <a:gd name="T19" fmla="*/ 0 60000 65536"/>
-              <a:gd name="T20" fmla="*/ 0 60000 65536"/>
-              <a:gd name="T21" fmla="*/ 0 w 404"/>
-              <a:gd name="T22" fmla="*/ 0 h 1294"/>
-              <a:gd name="T23" fmla="*/ 404 w 404"/>
-              <a:gd name="T24" fmla="*/ 1294 h 1294"/>
-            </a:gdLst>
-            <a:ahLst/>
-            <a:cxnLst>
-              <a:cxn ang="T14">
-                <a:pos x="T0" y="T1"/>
-              </a:cxn>
-              <a:cxn ang="T15">
-                <a:pos x="T2" y="T3"/>
-              </a:cxn>
-              <a:cxn ang="T16">
-                <a:pos x="T4" y="T5"/>
-              </a:cxn>
-              <a:cxn ang="T17">
-                <a:pos x="T6" y="T7"/>
-              </a:cxn>
-              <a:cxn ang="T18">
-                <a:pos x="T8" y="T9"/>
-              </a:cxn>
-              <a:cxn ang="T19">
-                <a:pos x="T10" y="T11"/>
-              </a:cxn>
-              <a:cxn ang="T20">
-                <a:pos x="T12" y="T13"/>
-              </a:cxn>
-            </a:cxnLst>
-            <a:rect l="T21" t="T22" r="T23" b="T24"/>
-            <a:pathLst>
-              <a:path w="404" h="1294">
-                <a:moveTo>
-                  <a:pt x="404" y="771"/>
-                </a:moveTo>
-                <a:lnTo>
-                  <a:pt x="87" y="0"/>
-                </a:lnTo>
-                <a:lnTo>
-                  <a:pt x="224" y="574"/>
-                </a:lnTo>
-                <a:lnTo>
-                  <a:pt x="0" y="466"/>
-                </a:lnTo>
-                <a:lnTo>
-                  <a:pt x="301" y="1294"/>
-                </a:lnTo>
-                <a:lnTo>
-                  <a:pt x="155" y="686"/>
-                </a:lnTo>
-                <a:lnTo>
-                  <a:pt x="404" y="771"/>
-                </a:lnTo>
-                <a:close/>
-              </a:path>
-            </a:pathLst>
-          </a:custGeom>
-          <a:solidFill>
-            <a:schemeClr val="tx1"/>
-          </a:solidFill>
-          <a:ln w="3175">
-            <a:solidFill>
-              <a:schemeClr val="tx1">
-                <a:lumMod val="95000"/>
-                <a:lumOff val="5000"/>
-              </a:schemeClr>
-            </a:solidFill>
-            <a:round/>
-            <a:headEnd/>
-            <a:tailEnd/>
-          </a:ln>
-        </p:spPr>
-        <p:txBody>
-          <a:bodyPr wrap="none" anchor="ctr"/>
-          <a:lstStyle/>
-          <a:p>
-            <a:endParaRPr lang="en-US" sz="600">
-              <a:latin typeface="Heiti SC Light" charset="-122"/>
-              <a:ea typeface="Heiti SC Light" charset="-122"/>
-              <a:cs typeface="Heiti SC Light" charset="-122"/>
-            </a:endParaRPr>
-          </a:p>
-        </p:txBody>
-      </p:sp>
-      <p:grpSp>
-        <p:nvGrpSpPr>
-          <p:cNvPr id="2" name="Group 1"/>
-          <p:cNvGrpSpPr/>
-          <p:nvPr/>
-        </p:nvGrpSpPr>
-        <p:grpSpPr>
-          <a:xfrm>
-            <a:off x="1429622" y="558868"/>
-            <a:ext cx="401067" cy="184666"/>
-            <a:chOff x="2054746" y="899390"/>
-            <a:chExt cx="401067" cy="184666"/>
-          </a:xfrm>
-        </p:grpSpPr>
-        <p:sp>
-          <p:nvSpPr>
-            <p:cNvPr id="44" name="Rectangle 43"/>
-            <p:cNvSpPr/>
-            <p:nvPr/>
-          </p:nvSpPr>
-          <p:spPr>
-            <a:xfrm>
-              <a:off x="2068215" y="901741"/>
-              <a:ext cx="314100" cy="181712"/>
+              <a:off x="1443091" y="144526"/>
+              <a:ext cx="314101" cy="165794"/>
             </a:xfrm>
             <a:prstGeom prst="rect">
               <a:avLst/>
@@ -4464,297 +3630,27 @@
             <a:lstStyle/>
             <a:p>
               <a:pPr algn="ctr"/>
-              <a:endParaRPr lang="en-US" sz="600">
-                <a:latin typeface="Heiti SC Light" charset="-122"/>
-                <a:ea typeface="Heiti SC Light" charset="-122"/>
+              <a:endParaRPr lang="en-US" sz="600" b="1">
+                <a:latin typeface="Heiti SC Medium" pitchFamily="2" charset="-128"/>
+                <a:ea typeface="Heiti SC Medium" pitchFamily="2" charset="-128"/>
                 <a:cs typeface="Heiti SC Light" charset="-122"/>
               </a:endParaRPr>
             </a:p>
           </p:txBody>
         </p:sp>
-        <p:sp>
-          <p:nvSpPr>
-            <p:cNvPr id="46" name="TextBox 45"/>
-            <p:cNvSpPr txBox="1"/>
-            <p:nvPr/>
-          </p:nvSpPr>
-          <p:spPr>
-            <a:xfrm>
-              <a:off x="2054746" y="899390"/>
-              <a:ext cx="401067" cy="184666"/>
-            </a:xfrm>
-            <a:prstGeom prst="rect">
-              <a:avLst/>
-            </a:prstGeom>
-            <a:noFill/>
-          </p:spPr>
-          <p:txBody>
-            <a:bodyPr wrap="square" rtlCol="0">
-              <a:spAutoFit/>
-            </a:bodyPr>
-            <a:lstStyle/>
-            <a:p>
-              <a:r>
-                <a:rPr lang="en-US" sz="600" dirty="0">
-                  <a:latin typeface="Heiti SC Light" charset="-122"/>
-                  <a:ea typeface="Heiti SC Light" charset="-122"/>
-                  <a:cs typeface="Heiti SC Light" charset="-122"/>
-                </a:rPr>
-                <a:t>SGW</a:t>
-              </a:r>
-              <a:endParaRPr lang="en-US" sz="600" baseline="-25000" dirty="0">
-                <a:latin typeface="Heiti SC Light" charset="-122"/>
-                <a:ea typeface="Heiti SC Light" charset="-122"/>
-                <a:cs typeface="Heiti SC Light" charset="-122"/>
-              </a:endParaRPr>
-            </a:p>
-          </p:txBody>
-        </p:sp>
-      </p:grpSp>
-      <p:grpSp>
-        <p:nvGrpSpPr>
-          <p:cNvPr id="56" name="Group 55"/>
-          <p:cNvGrpSpPr/>
-          <p:nvPr/>
-        </p:nvGrpSpPr>
-        <p:grpSpPr>
-          <a:xfrm>
-            <a:off x="1999396" y="561220"/>
-            <a:ext cx="388943" cy="184666"/>
-            <a:chOff x="2089909" y="869176"/>
-            <a:chExt cx="373791" cy="184411"/>
-          </a:xfrm>
-        </p:grpSpPr>
-        <p:sp>
-          <p:nvSpPr>
-            <p:cNvPr id="57" name="Rectangle 56"/>
-            <p:cNvSpPr/>
-            <p:nvPr/>
-          </p:nvSpPr>
-          <p:spPr>
-            <a:xfrm>
-              <a:off x="2118024" y="877582"/>
-              <a:ext cx="289509" cy="163744"/>
-            </a:xfrm>
-            <a:prstGeom prst="rect">
-              <a:avLst/>
-            </a:prstGeom>
-            <a:ln w="6350" cmpd="sng">
-              <a:solidFill>
-                <a:srgbClr val="000000"/>
-              </a:solidFill>
-            </a:ln>
-            <a:effectLst/>
-          </p:spPr>
-          <p:style>
-            <a:lnRef idx="2">
-              <a:schemeClr val="dk1"/>
-            </a:lnRef>
-            <a:fillRef idx="1">
-              <a:schemeClr val="lt1"/>
-            </a:fillRef>
-            <a:effectRef idx="0">
-              <a:schemeClr val="dk1"/>
-            </a:effectRef>
-            <a:fontRef idx="minor">
-              <a:schemeClr val="dk1"/>
-            </a:fontRef>
-          </p:style>
-          <p:txBody>
-            <a:bodyPr lIns="39182" tIns="19591" rIns="39182" bIns="19591" spcCol="0" rtlCol="0" anchor="ctr"/>
-            <a:lstStyle/>
-            <a:p>
-              <a:pPr algn="ctr"/>
-              <a:endParaRPr lang="en-US" sz="600">
-                <a:latin typeface="Heiti SC Light" charset="-122"/>
-                <a:ea typeface="Heiti SC Light" charset="-122"/>
-                <a:cs typeface="Heiti SC Light" charset="-122"/>
-              </a:endParaRPr>
-            </a:p>
-          </p:txBody>
-        </p:sp>
-        <p:sp>
-          <p:nvSpPr>
-            <p:cNvPr id="58" name="TextBox 57"/>
-            <p:cNvSpPr txBox="1"/>
-            <p:nvPr/>
-          </p:nvSpPr>
-          <p:spPr>
-            <a:xfrm>
-              <a:off x="2089909" y="869176"/>
-              <a:ext cx="373791" cy="184411"/>
-            </a:xfrm>
-            <a:prstGeom prst="rect">
-              <a:avLst/>
-            </a:prstGeom>
-            <a:noFill/>
-          </p:spPr>
-          <p:txBody>
-            <a:bodyPr wrap="square" rtlCol="0">
-              <a:spAutoFit/>
-            </a:bodyPr>
-            <a:lstStyle/>
-            <a:p>
-              <a:r>
-                <a:rPr lang="en-US" sz="600" dirty="0">
-                  <a:latin typeface="Heiti SC Light" charset="-122"/>
-                  <a:ea typeface="Heiti SC Light" charset="-122"/>
-                  <a:cs typeface="Heiti SC Light" charset="-122"/>
-                </a:rPr>
-                <a:t>PGW</a:t>
-              </a:r>
-              <a:endParaRPr lang="en-US" sz="600" baseline="-25000" dirty="0">
-                <a:latin typeface="Heiti SC Light" charset="-122"/>
-                <a:ea typeface="Heiti SC Light" charset="-122"/>
-                <a:cs typeface="Heiti SC Light" charset="-122"/>
-              </a:endParaRPr>
-            </a:p>
-          </p:txBody>
-        </p:sp>
-      </p:grpSp>
-      <p:cxnSp>
-        <p:nvCxnSpPr>
-          <p:cNvPr id="84" name="Straight Arrow Connector 83"/>
-          <p:cNvCxnSpPr>
-            <a:stCxn id="57" idx="1"/>
-            <a:endCxn id="44" idx="3"/>
-          </p:cNvCxnSpPr>
-          <p:nvPr/>
-        </p:nvCxnSpPr>
-        <p:spPr>
-          <a:xfrm flipH="1">
-            <a:off x="1757191" y="651623"/>
-            <a:ext cx="271460" cy="452"/>
-          </a:xfrm>
-          <a:prstGeom prst="straightConnector1">
-            <a:avLst/>
-          </a:prstGeom>
-          <a:ln w="6350">
-            <a:solidFill>
-              <a:schemeClr val="accent1"/>
-            </a:solidFill>
-            <a:headEnd type="none" w="sm" len="sm"/>
-            <a:tailEnd type="none" w="sm" len="sm"/>
-          </a:ln>
-          <a:effectLst/>
-        </p:spPr>
-        <p:style>
-          <a:lnRef idx="2">
-            <a:schemeClr val="accent1"/>
-          </a:lnRef>
-          <a:fillRef idx="0">
-            <a:schemeClr val="accent1"/>
-          </a:fillRef>
-          <a:effectRef idx="1">
-            <a:schemeClr val="accent1"/>
-          </a:effectRef>
-          <a:fontRef idx="minor">
-            <a:schemeClr val="tx1"/>
-          </a:fontRef>
-        </p:style>
-      </p:cxnSp>
-      <p:cxnSp>
-        <p:nvCxnSpPr>
-          <p:cNvPr id="104" name="Straight Connector 103"/>
-          <p:cNvCxnSpPr>
-            <a:stCxn id="63" idx="3"/>
-            <a:endCxn id="44" idx="1"/>
-          </p:cNvCxnSpPr>
-          <p:nvPr/>
-        </p:nvCxnSpPr>
-        <p:spPr>
-          <a:xfrm>
-            <a:off x="984088" y="590488"/>
-            <a:ext cx="459003" cy="61587"/>
-          </a:xfrm>
-          <a:prstGeom prst="line">
-            <a:avLst/>
-          </a:prstGeom>
-          <a:ln w="6350" cmpd="sng">
-            <a:solidFill>
-              <a:schemeClr val="accent1"/>
-            </a:solidFill>
-          </a:ln>
-          <a:effectLst/>
-        </p:spPr>
-        <p:style>
-          <a:lnRef idx="2">
-            <a:schemeClr val="accent1"/>
-          </a:lnRef>
-          <a:fillRef idx="0">
-            <a:schemeClr val="accent1"/>
-          </a:fillRef>
-          <a:effectRef idx="1">
-            <a:schemeClr val="accent1"/>
-          </a:effectRef>
-          <a:fontRef idx="minor">
-            <a:schemeClr val="tx1"/>
-          </a:fontRef>
-        </p:style>
-      </p:cxnSp>
-      <p:cxnSp>
-        <p:nvCxnSpPr>
-          <p:cNvPr id="107" name="Straight Connector 106"/>
-          <p:cNvCxnSpPr>
-            <a:stCxn id="62" idx="3"/>
-            <a:endCxn id="44" idx="1"/>
-          </p:cNvCxnSpPr>
-          <p:nvPr/>
-        </p:nvCxnSpPr>
-        <p:spPr>
-          <a:xfrm>
-            <a:off x="984513" y="351335"/>
-            <a:ext cx="458578" cy="300740"/>
-          </a:xfrm>
-          <a:prstGeom prst="line">
-            <a:avLst/>
-          </a:prstGeom>
-          <a:ln w="6350" cmpd="sng">
-            <a:solidFill>
-              <a:schemeClr val="accent1"/>
-            </a:solidFill>
-          </a:ln>
-          <a:effectLst/>
-        </p:spPr>
-        <p:style>
-          <a:lnRef idx="2">
-            <a:schemeClr val="accent1"/>
-          </a:lnRef>
-          <a:fillRef idx="0">
-            <a:schemeClr val="accent1"/>
-          </a:fillRef>
-          <a:effectRef idx="1">
-            <a:schemeClr val="accent1"/>
-          </a:effectRef>
-          <a:fontRef idx="minor">
-            <a:schemeClr val="tx1"/>
-          </a:fontRef>
-        </p:style>
-      </p:cxnSp>
-      <p:grpSp>
-        <p:nvGrpSpPr>
-          <p:cNvPr id="96" name="Group 95"/>
-          <p:cNvGrpSpPr/>
-          <p:nvPr/>
-        </p:nvGrpSpPr>
-        <p:grpSpPr>
-          <a:xfrm>
-            <a:off x="2260361" y="80210"/>
-            <a:ext cx="582328" cy="276999"/>
-            <a:chOff x="779984" y="1234089"/>
-            <a:chExt cx="573414" cy="302434"/>
-          </a:xfrm>
-        </p:grpSpPr>
         <p:cxnSp>
           <p:nvCxnSpPr>
-            <p:cNvPr id="125" name="Straight Connector 124"/>
-            <p:cNvCxnSpPr/>
+            <p:cNvPr id="245" name="Straight Connector 244"/>
+            <p:cNvCxnSpPr>
+              <a:stCxn id="241" idx="3"/>
+              <a:endCxn id="105" idx="1"/>
+            </p:cNvCxnSpPr>
             <p:nvPr/>
           </p:nvCxnSpPr>
           <p:spPr>
             <a:xfrm>
-              <a:off x="1152514" y="1340662"/>
-              <a:ext cx="182090" cy="0"/>
+              <a:off x="1757192" y="227423"/>
+              <a:ext cx="270711" cy="802"/>
             </a:xfrm>
             <a:prstGeom prst="line">
               <a:avLst/>
@@ -4784,14 +3680,1011 @@
         </p:cxnSp>
         <p:cxnSp>
           <p:nvCxnSpPr>
-            <p:cNvPr id="129" name="Straight Connector 128"/>
-            <p:cNvCxnSpPr/>
+            <p:cNvPr id="247" name="Straight Connector 246"/>
+            <p:cNvCxnSpPr>
+              <a:stCxn id="44" idx="0"/>
+              <a:endCxn id="241" idx="2"/>
+            </p:cNvCxnSpPr>
+            <p:nvPr/>
+          </p:nvCxnSpPr>
+          <p:spPr>
+            <a:xfrm flipV="1">
+              <a:off x="1600141" y="310320"/>
+              <a:ext cx="1" cy="250899"/>
+            </a:xfrm>
+            <a:prstGeom prst="line">
+              <a:avLst/>
+            </a:prstGeom>
+            <a:ln w="6350" cmpd="sng">
+              <a:solidFill>
+                <a:schemeClr val="accent2"/>
+              </a:solidFill>
+              <a:prstDash val="dash"/>
+            </a:ln>
+            <a:effectLst/>
+          </p:spPr>
+          <p:style>
+            <a:lnRef idx="2">
+              <a:schemeClr val="accent1"/>
+            </a:lnRef>
+            <a:fillRef idx="0">
+              <a:schemeClr val="accent1"/>
+            </a:fillRef>
+            <a:effectRef idx="1">
+              <a:schemeClr val="accent1"/>
+            </a:effectRef>
+            <a:fontRef idx="minor">
+              <a:schemeClr val="tx1"/>
+            </a:fontRef>
+          </p:style>
+        </p:cxnSp>
+        <p:sp>
+          <p:nvSpPr>
+            <p:cNvPr id="258" name="TextBox 257"/>
+            <p:cNvSpPr txBox="1"/>
+            <p:nvPr/>
+          </p:nvSpPr>
+          <p:spPr>
+            <a:xfrm>
+              <a:off x="1344461" y="132217"/>
+              <a:ext cx="504315" cy="184666"/>
+            </a:xfrm>
+            <a:prstGeom prst="rect">
+              <a:avLst/>
+            </a:prstGeom>
+            <a:noFill/>
+          </p:spPr>
+          <p:txBody>
+            <a:bodyPr wrap="square" rtlCol="0">
+              <a:spAutoFit/>
+            </a:bodyPr>
+            <a:lstStyle/>
+            <a:p>
+              <a:pPr algn="ctr"/>
+              <a:r>
+                <a:rPr lang="en-US" sz="600" b="1" dirty="0">
+                  <a:latin typeface="Heiti SC Medium" pitchFamily="2" charset="-128"/>
+                  <a:ea typeface="Heiti SC Medium" pitchFamily="2" charset="-128"/>
+                  <a:cs typeface="Heiti SC Light" charset="-122"/>
+                </a:rPr>
+                <a:t>MME</a:t>
+              </a:r>
+              <a:endParaRPr lang="en-US" sz="600" b="1" baseline="-25000" dirty="0">
+                <a:latin typeface="Heiti SC Medium" pitchFamily="2" charset="-128"/>
+                <a:ea typeface="Heiti SC Medium" pitchFamily="2" charset="-128"/>
+                <a:cs typeface="Heiti SC Light" charset="-122"/>
+              </a:endParaRPr>
+            </a:p>
+          </p:txBody>
+        </p:sp>
+        <p:grpSp>
+          <p:nvGrpSpPr>
+            <p:cNvPr id="264" name="Group 263"/>
+            <p:cNvGrpSpPr/>
+            <p:nvPr/>
+          </p:nvGrpSpPr>
+          <p:grpSpPr>
+            <a:xfrm>
+              <a:off x="17249" y="26575"/>
+              <a:ext cx="731407" cy="729957"/>
+              <a:chOff x="42058" y="13100"/>
+              <a:chExt cx="731407" cy="729957"/>
+            </a:xfrm>
+          </p:grpSpPr>
+          <p:sp>
+            <p:nvSpPr>
+              <p:cNvPr id="267" name="TextBox 266"/>
+              <p:cNvSpPr txBox="1"/>
+              <p:nvPr/>
+            </p:nvSpPr>
+            <p:spPr>
+              <a:xfrm>
+                <a:off x="42058" y="13100"/>
+                <a:ext cx="731407" cy="276999"/>
+              </a:xfrm>
+              <a:prstGeom prst="rect">
+                <a:avLst/>
+              </a:prstGeom>
+              <a:noFill/>
+            </p:spPr>
+            <p:txBody>
+              <a:bodyPr wrap="square" rtlCol="0">
+                <a:spAutoFit/>
+              </a:bodyPr>
+              <a:lstStyle/>
+              <a:p>
+                <a:pPr algn="ctr"/>
+                <a:r>
+                  <a:rPr lang="en-US" sz="600" b="1" dirty="0">
+                    <a:latin typeface="Heiti SC Medium" pitchFamily="2" charset="-128"/>
+                    <a:ea typeface="Heiti SC Medium" pitchFamily="2" charset="-128"/>
+                    <a:cs typeface="Heiti SC Light" charset="-122"/>
+                  </a:rPr>
+                  <a:t>UEs / IoT Devices</a:t>
+                </a:r>
+              </a:p>
+            </p:txBody>
+          </p:sp>
+          <p:pic>
+            <p:nvPicPr>
+              <p:cNvPr id="268" name="Picture 267"/>
+              <p:cNvPicPr>
+                <a:picLocks noChangeAspect="1"/>
+              </p:cNvPicPr>
+              <p:nvPr/>
+            </p:nvPicPr>
+            <p:blipFill>
+              <a:blip r:embed="rId4">
+                <a:extLst>
+                  <a:ext uri="{BEBA8EAE-BF5A-486C-A8C5-ECC9F3942E4B}">
+                    <a14:imgProps xmlns:a14="http://schemas.microsoft.com/office/drawing/2010/main">
+                      <a14:imgLayer r:embed="rId5">
+                        <a14:imgEffect>
+                          <a14:sharpenSoften amount="50000"/>
+                        </a14:imgEffect>
+                      </a14:imgLayer>
+                    </a14:imgProps>
+                  </a:ext>
+                </a:extLst>
+              </a:blip>
+              <a:stretch>
+                <a:fillRect/>
+              </a:stretch>
+            </p:blipFill>
+            <p:spPr>
+              <a:xfrm>
+                <a:off x="136793" y="354175"/>
+                <a:ext cx="258938" cy="93160"/>
+              </a:xfrm>
+              <a:prstGeom prst="rect">
+                <a:avLst/>
+              </a:prstGeom>
+            </p:spPr>
+          </p:pic>
+          <p:sp>
+            <p:nvSpPr>
+              <p:cNvPr id="269" name="Cloud 268"/>
+              <p:cNvSpPr/>
+              <p:nvPr/>
+            </p:nvSpPr>
+            <p:spPr>
+              <a:xfrm>
+                <a:off x="60031" y="272526"/>
+                <a:ext cx="596431" cy="470531"/>
+              </a:xfrm>
+              <a:prstGeom prst="cloud">
+                <a:avLst/>
+              </a:prstGeom>
+              <a:noFill/>
+              <a:ln w="6350">
+                <a:solidFill>
+                  <a:schemeClr val="tx1">
+                    <a:lumMod val="85000"/>
+                    <a:lumOff val="15000"/>
+                  </a:schemeClr>
+                </a:solidFill>
+              </a:ln>
+              <a:effectLst/>
+            </p:spPr>
+            <p:style>
+              <a:lnRef idx="2">
+                <a:schemeClr val="accent1">
+                  <a:shade val="50000"/>
+                </a:schemeClr>
+              </a:lnRef>
+              <a:fillRef idx="1">
+                <a:schemeClr val="accent1"/>
+              </a:fillRef>
+              <a:effectRef idx="0">
+                <a:schemeClr val="accent1"/>
+              </a:effectRef>
+              <a:fontRef idx="minor">
+                <a:schemeClr val="lt1"/>
+              </a:fontRef>
+            </p:style>
+            <p:txBody>
+              <a:bodyPr rtlCol="0" anchor="ctr"/>
+              <a:lstStyle/>
+              <a:p>
+                <a:endParaRPr lang="en-US" sz="600" b="1">
+                  <a:latin typeface="Heiti SC Medium" pitchFamily="2" charset="-128"/>
+                  <a:ea typeface="Heiti SC Medium" pitchFamily="2" charset="-128"/>
+                  <a:cs typeface="Heiti SC Light" charset="-122"/>
+                </a:endParaRPr>
+              </a:p>
+            </p:txBody>
+          </p:sp>
+          <p:pic>
+            <p:nvPicPr>
+              <p:cNvPr id="270" name="Picture 269"/>
+              <p:cNvPicPr>
+                <a:picLocks noChangeAspect="1"/>
+              </p:cNvPicPr>
+              <p:nvPr/>
+            </p:nvPicPr>
+            <p:blipFill>
+              <a:blip r:embed="rId6"/>
+              <a:stretch>
+                <a:fillRect/>
+              </a:stretch>
+            </p:blipFill>
+            <p:spPr>
+              <a:xfrm>
+                <a:off x="428766" y="519812"/>
+                <a:ext cx="44929" cy="102184"/>
+              </a:xfrm>
+              <a:prstGeom prst="rect">
+                <a:avLst/>
+              </a:prstGeom>
+            </p:spPr>
+          </p:pic>
+          <p:pic>
+            <p:nvPicPr>
+              <p:cNvPr id="271" name="Picture 270"/>
+              <p:cNvPicPr>
+                <a:picLocks noChangeAspect="1"/>
+              </p:cNvPicPr>
+              <p:nvPr/>
+            </p:nvPicPr>
+            <p:blipFill>
+              <a:blip r:embed="rId7">
+                <a:extLst>
+                  <a:ext uri="{BEBA8EAE-BF5A-486C-A8C5-ECC9F3942E4B}">
+                    <a14:imgProps xmlns:a14="http://schemas.microsoft.com/office/drawing/2010/main">
+                      <a14:imgLayer r:embed="rId8">
+                        <a14:imgEffect>
+                          <a14:sharpenSoften amount="100000"/>
+                        </a14:imgEffect>
+                        <a14:imgEffect>
+                          <a14:colorTemperature colorTemp="4700"/>
+                        </a14:imgEffect>
+                      </a14:imgLayer>
+                    </a14:imgProps>
+                  </a:ext>
+                </a:extLst>
+              </a:blip>
+              <a:stretch>
+                <a:fillRect/>
+              </a:stretch>
+            </p:blipFill>
+            <p:spPr>
+              <a:xfrm>
+                <a:off x="437275" y="355902"/>
+                <a:ext cx="44929" cy="102184"/>
+              </a:xfrm>
+              <a:prstGeom prst="rect">
+                <a:avLst/>
+              </a:prstGeom>
+            </p:spPr>
+          </p:pic>
+          <p:pic>
+            <p:nvPicPr>
+              <p:cNvPr id="272" name="Picture 271"/>
+              <p:cNvPicPr>
+                <a:picLocks noChangeAspect="1"/>
+              </p:cNvPicPr>
+              <p:nvPr/>
+            </p:nvPicPr>
+            <p:blipFill>
+              <a:blip r:embed="rId6"/>
+              <a:stretch>
+                <a:fillRect/>
+              </a:stretch>
+            </p:blipFill>
+            <p:spPr>
+              <a:xfrm>
+                <a:off x="516132" y="436424"/>
+                <a:ext cx="44929" cy="102184"/>
+              </a:xfrm>
+              <a:prstGeom prst="rect">
+                <a:avLst/>
+              </a:prstGeom>
+            </p:spPr>
+          </p:pic>
+          <p:pic>
+            <p:nvPicPr>
+              <p:cNvPr id="273" name="Picture 272"/>
+              <p:cNvPicPr>
+                <a:picLocks noChangeAspect="1"/>
+              </p:cNvPicPr>
+              <p:nvPr/>
+            </p:nvPicPr>
+            <p:blipFill>
+              <a:blip r:embed="rId9"/>
+              <a:stretch>
+                <a:fillRect/>
+              </a:stretch>
+            </p:blipFill>
+            <p:spPr>
+              <a:xfrm>
+                <a:off x="163145" y="433265"/>
+                <a:ext cx="253351" cy="252691"/>
+              </a:xfrm>
+              <a:prstGeom prst="rect">
+                <a:avLst/>
+              </a:prstGeom>
+            </p:spPr>
+          </p:pic>
+        </p:grpSp>
+        <p:grpSp>
+          <p:nvGrpSpPr>
+            <p:cNvPr id="9" name="Group 8"/>
+            <p:cNvGrpSpPr/>
+            <p:nvPr/>
+          </p:nvGrpSpPr>
+          <p:grpSpPr>
+            <a:xfrm>
+              <a:off x="846574" y="213023"/>
+              <a:ext cx="203105" cy="506461"/>
+              <a:chOff x="566019" y="-278101"/>
+              <a:chExt cx="203105" cy="506461"/>
+            </a:xfrm>
+          </p:grpSpPr>
+          <p:sp>
+            <p:nvSpPr>
+              <p:cNvPr id="60" name="Rectangle 59"/>
+              <p:cNvSpPr/>
+              <p:nvPr/>
+            </p:nvSpPr>
+            <p:spPr>
+              <a:xfrm>
+                <a:off x="566019" y="-278101"/>
+                <a:ext cx="203105" cy="506461"/>
+              </a:xfrm>
+              <a:prstGeom prst="rect">
+                <a:avLst/>
+              </a:prstGeom>
+              <a:ln w="6350" cmpd="sng">
+                <a:solidFill>
+                  <a:schemeClr val="tx1"/>
+                </a:solidFill>
+                <a:prstDash val="dash"/>
+              </a:ln>
+            </p:spPr>
+            <p:style>
+              <a:lnRef idx="2">
+                <a:schemeClr val="dk1"/>
+              </a:lnRef>
+              <a:fillRef idx="1">
+                <a:schemeClr val="lt1"/>
+              </a:fillRef>
+              <a:effectRef idx="0">
+                <a:schemeClr val="dk1"/>
+              </a:effectRef>
+              <a:fontRef idx="minor">
+                <a:schemeClr val="dk1"/>
+              </a:fontRef>
+            </p:style>
+            <p:txBody>
+              <a:bodyPr rtlCol="0" anchor="ctr"/>
+              <a:lstStyle/>
+              <a:p>
+                <a:endParaRPr lang="en-US" sz="600" b="1" dirty="0">
+                  <a:solidFill>
+                    <a:schemeClr val="tx1"/>
+                  </a:solidFill>
+                  <a:latin typeface="Heiti SC Medium" pitchFamily="2" charset="-128"/>
+                  <a:ea typeface="Heiti SC Medium" pitchFamily="2" charset="-128"/>
+                  <a:cs typeface="Heiti SC Light" charset="-122"/>
+                </a:endParaRPr>
+              </a:p>
+            </p:txBody>
+          </p:sp>
+          <p:grpSp>
+            <p:nvGrpSpPr>
+              <p:cNvPr id="8" name="Group 7"/>
+              <p:cNvGrpSpPr/>
+              <p:nvPr/>
+            </p:nvGrpSpPr>
+            <p:grpSpPr>
+              <a:xfrm>
+                <a:off x="630025" y="-263175"/>
+                <a:ext cx="73933" cy="485925"/>
+                <a:chOff x="630025" y="-263175"/>
+                <a:chExt cx="73933" cy="485925"/>
+              </a:xfrm>
+            </p:grpSpPr>
+            <p:graphicFrame>
+              <p:nvGraphicFramePr>
+                <p:cNvPr id="62" name="Object 8"/>
+                <p:cNvGraphicFramePr>
+                  <a:graphicFrameLocks noChangeAspect="1"/>
+                </p:cNvGraphicFramePr>
+                <p:nvPr>
+                  <p:extLst>
+                    <p:ext uri="{D42A27DB-BD31-4B8C-83A1-F6EECF244321}">
+                      <p14:modId xmlns:p14="http://schemas.microsoft.com/office/powerpoint/2010/main" val="2084861946"/>
+                    </p:ext>
+                  </p:extLst>
+                </p:nvPr>
+              </p:nvGraphicFramePr>
+              <p:xfrm>
+                <a:off x="630450" y="-263175"/>
+                <a:ext cx="73508" cy="246772"/>
+              </p:xfrm>
+              <a:graphic>
+                <a:graphicData uri="http://schemas.openxmlformats.org/presentationml/2006/ole">
+                  <mc:AlternateContent xmlns:mc="http://schemas.openxmlformats.org/markup-compatibility/2006">
+                    <mc:Choice xmlns:v="urn:schemas-microsoft-com:vml" Requires="v">
+                      <p:oleObj spid="_x0000_s1959" name="Visio" r:id="rId10" imgW="635000" imgH="1511300" progId="">
+                        <p:embed/>
+                      </p:oleObj>
+                    </mc:Choice>
+                    <mc:Fallback>
+                      <p:oleObj name="Visio" r:id="rId10" imgW="635000" imgH="1511300" progId="">
+                        <p:embed/>
+                        <p:pic>
+                          <p:nvPicPr>
+                            <p:cNvPr id="0" name=""/>
+                            <p:cNvPicPr>
+                              <a:picLocks noChangeAspect="1" noChangeArrowheads="1"/>
+                            </p:cNvPicPr>
+                            <p:nvPr/>
+                          </p:nvPicPr>
+                          <p:blipFill>
+                            <a:blip r:embed="rId11">
+                              <a:lum bright="-100000"/>
+                              <a:extLst>
+                                <a:ext uri="{28A0092B-C50C-407E-A947-70E740481C1C}">
+                                  <a14:useLocalDpi xmlns:a14="http://schemas.microsoft.com/office/drawing/2010/main" val="0"/>
+                                </a:ext>
+                              </a:extLst>
+                            </a:blip>
+                            <a:srcRect/>
+                            <a:stretch>
+                              <a:fillRect/>
+                            </a:stretch>
+                          </p:blipFill>
+                          <p:spPr bwMode="auto">
+                            <a:xfrm>
+                              <a:off x="630450" y="-263175"/>
+                              <a:ext cx="73508" cy="246772"/>
+                            </a:xfrm>
+                            <a:prstGeom prst="rect">
+                              <a:avLst/>
+                            </a:prstGeom>
+                            <a:noFill/>
+                            <a:ln>
+                              <a:noFill/>
+                            </a:ln>
+                          </p:spPr>
+                        </p:pic>
+                      </p:oleObj>
+                    </mc:Fallback>
+                  </mc:AlternateContent>
+                </a:graphicData>
+              </a:graphic>
+            </p:graphicFrame>
+            <p:graphicFrame>
+              <p:nvGraphicFramePr>
+                <p:cNvPr id="63" name="Object 8"/>
+                <p:cNvGraphicFramePr>
+                  <a:graphicFrameLocks noChangeAspect="1"/>
+                </p:cNvGraphicFramePr>
+                <p:nvPr>
+                  <p:extLst>
+                    <p:ext uri="{D42A27DB-BD31-4B8C-83A1-F6EECF244321}">
+                      <p14:modId xmlns:p14="http://schemas.microsoft.com/office/powerpoint/2010/main" val="116830518"/>
+                    </p:ext>
+                  </p:extLst>
+                </p:nvPr>
+              </p:nvGraphicFramePr>
+              <p:xfrm>
+                <a:off x="630025" y="-24022"/>
+                <a:ext cx="73508" cy="246772"/>
+              </p:xfrm>
+              <a:graphic>
+                <a:graphicData uri="http://schemas.openxmlformats.org/presentationml/2006/ole">
+                  <mc:AlternateContent xmlns:mc="http://schemas.openxmlformats.org/markup-compatibility/2006">
+                    <mc:Choice xmlns:v="urn:schemas-microsoft-com:vml" Requires="v">
+                      <p:oleObj spid="_x0000_s1960" name="Visio" r:id="rId12" imgW="635000" imgH="1511300" progId="">
+                        <p:embed/>
+                      </p:oleObj>
+                    </mc:Choice>
+                    <mc:Fallback>
+                      <p:oleObj name="Visio" r:id="rId12" imgW="635000" imgH="1511300" progId="">
+                        <p:embed/>
+                        <p:pic>
+                          <p:nvPicPr>
+                            <p:cNvPr id="0" name=""/>
+                            <p:cNvPicPr>
+                              <a:picLocks noChangeAspect="1" noChangeArrowheads="1"/>
+                            </p:cNvPicPr>
+                            <p:nvPr/>
+                          </p:nvPicPr>
+                          <p:blipFill>
+                            <a:blip r:embed="rId11">
+                              <a:lum bright="-100000"/>
+                              <a:extLst>
+                                <a:ext uri="{28A0092B-C50C-407E-A947-70E740481C1C}">
+                                  <a14:useLocalDpi xmlns:a14="http://schemas.microsoft.com/office/drawing/2010/main" val="0"/>
+                                </a:ext>
+                              </a:extLst>
+                            </a:blip>
+                            <a:srcRect/>
+                            <a:stretch>
+                              <a:fillRect/>
+                            </a:stretch>
+                          </p:blipFill>
+                          <p:spPr bwMode="auto">
+                            <a:xfrm>
+                              <a:off x="630025" y="-24022"/>
+                              <a:ext cx="73508" cy="246772"/>
+                            </a:xfrm>
+                            <a:prstGeom prst="rect">
+                              <a:avLst/>
+                            </a:prstGeom>
+                            <a:noFill/>
+                            <a:ln>
+                              <a:noFill/>
+                            </a:ln>
+                          </p:spPr>
+                        </p:pic>
+                      </p:oleObj>
+                    </mc:Fallback>
+                  </mc:AlternateContent>
+                </a:graphicData>
+              </a:graphic>
+            </p:graphicFrame>
+          </p:grpSp>
+        </p:grpSp>
+        <p:cxnSp>
+          <p:nvCxnSpPr>
+            <p:cNvPr id="68" name="Straight Connector 67"/>
+            <p:cNvCxnSpPr>
+              <a:stCxn id="62" idx="3"/>
+              <a:endCxn id="241" idx="1"/>
+            </p:cNvCxnSpPr>
+            <p:nvPr/>
+          </p:nvCxnSpPr>
+          <p:spPr>
+            <a:xfrm flipV="1">
+              <a:off x="984513" y="227423"/>
+              <a:ext cx="458578" cy="123912"/>
+            </a:xfrm>
+            <a:prstGeom prst="line">
+              <a:avLst/>
+            </a:prstGeom>
+            <a:ln w="6350" cmpd="sng">
+              <a:solidFill>
+                <a:schemeClr val="accent2"/>
+              </a:solidFill>
+              <a:prstDash val="dash"/>
+            </a:ln>
+            <a:effectLst/>
+          </p:spPr>
+          <p:style>
+            <a:lnRef idx="2">
+              <a:schemeClr val="accent1"/>
+            </a:lnRef>
+            <a:fillRef idx="0">
+              <a:schemeClr val="accent1"/>
+            </a:fillRef>
+            <a:effectRef idx="1">
+              <a:schemeClr val="accent1"/>
+            </a:effectRef>
+            <a:fontRef idx="minor">
+              <a:schemeClr val="tx1"/>
+            </a:fontRef>
+          </p:style>
+        </p:cxnSp>
+        <p:cxnSp>
+          <p:nvCxnSpPr>
+            <p:cNvPr id="75" name="Straight Connector 74"/>
+            <p:cNvCxnSpPr>
+              <a:stCxn id="63" idx="3"/>
+              <a:endCxn id="241" idx="1"/>
+            </p:cNvCxnSpPr>
+            <p:nvPr/>
+          </p:nvCxnSpPr>
+          <p:spPr>
+            <a:xfrm flipV="1">
+              <a:off x="984088" y="227423"/>
+              <a:ext cx="459003" cy="363065"/>
+            </a:xfrm>
+            <a:prstGeom prst="line">
+              <a:avLst/>
+            </a:prstGeom>
+            <a:ln w="6350" cmpd="sng">
+              <a:solidFill>
+                <a:schemeClr val="accent2"/>
+              </a:solidFill>
+              <a:prstDash val="dash"/>
+            </a:ln>
+            <a:effectLst/>
+          </p:spPr>
+          <p:style>
+            <a:lnRef idx="2">
+              <a:schemeClr val="accent1"/>
+            </a:lnRef>
+            <a:fillRef idx="0">
+              <a:schemeClr val="accent1"/>
+            </a:fillRef>
+            <a:effectRef idx="1">
+              <a:schemeClr val="accent1"/>
+            </a:effectRef>
+            <a:fontRef idx="minor">
+              <a:schemeClr val="tx1"/>
+            </a:fontRef>
+          </p:style>
+        </p:cxnSp>
+        <p:sp>
+          <p:nvSpPr>
+            <p:cNvPr id="265" name="Freeform 29"/>
+            <p:cNvSpPr>
+              <a:spLocks/>
+            </p:cNvSpPr>
+            <p:nvPr/>
+          </p:nvSpPr>
+          <p:spPr bwMode="auto">
+            <a:xfrm rot="15900000" flipH="1" flipV="1">
+              <a:off x="697879" y="351626"/>
+              <a:ext cx="45719" cy="298729"/>
+            </a:xfrm>
+            <a:custGeom>
+              <a:avLst/>
+              <a:gdLst>
+                <a:gd name="T0" fmla="*/ 2147483647 w 404"/>
+                <a:gd name="T1" fmla="*/ 2147483647 h 1294"/>
+                <a:gd name="T2" fmla="*/ 2147483647 w 404"/>
+                <a:gd name="T3" fmla="*/ 0 h 1294"/>
+                <a:gd name="T4" fmla="*/ 2147483647 w 404"/>
+                <a:gd name="T5" fmla="*/ 2147483647 h 1294"/>
+                <a:gd name="T6" fmla="*/ 0 w 404"/>
+                <a:gd name="T7" fmla="*/ 2147483647 h 1294"/>
+                <a:gd name="T8" fmla="*/ 2147483647 w 404"/>
+                <a:gd name="T9" fmla="*/ 2147483647 h 1294"/>
+                <a:gd name="T10" fmla="*/ 2147483647 w 404"/>
+                <a:gd name="T11" fmla="*/ 2147483647 h 1294"/>
+                <a:gd name="T12" fmla="*/ 2147483647 w 404"/>
+                <a:gd name="T13" fmla="*/ 2147483647 h 1294"/>
+                <a:gd name="T14" fmla="*/ 0 60000 65536"/>
+                <a:gd name="T15" fmla="*/ 0 60000 65536"/>
+                <a:gd name="T16" fmla="*/ 0 60000 65536"/>
+                <a:gd name="T17" fmla="*/ 0 60000 65536"/>
+                <a:gd name="T18" fmla="*/ 0 60000 65536"/>
+                <a:gd name="T19" fmla="*/ 0 60000 65536"/>
+                <a:gd name="T20" fmla="*/ 0 60000 65536"/>
+                <a:gd name="T21" fmla="*/ 0 w 404"/>
+                <a:gd name="T22" fmla="*/ 0 h 1294"/>
+                <a:gd name="T23" fmla="*/ 404 w 404"/>
+                <a:gd name="T24" fmla="*/ 1294 h 1294"/>
+              </a:gdLst>
+              <a:ahLst/>
+              <a:cxnLst>
+                <a:cxn ang="T14">
+                  <a:pos x="T0" y="T1"/>
+                </a:cxn>
+                <a:cxn ang="T15">
+                  <a:pos x="T2" y="T3"/>
+                </a:cxn>
+                <a:cxn ang="T16">
+                  <a:pos x="T4" y="T5"/>
+                </a:cxn>
+                <a:cxn ang="T17">
+                  <a:pos x="T6" y="T7"/>
+                </a:cxn>
+                <a:cxn ang="T18">
+                  <a:pos x="T8" y="T9"/>
+                </a:cxn>
+                <a:cxn ang="T19">
+                  <a:pos x="T10" y="T11"/>
+                </a:cxn>
+                <a:cxn ang="T20">
+                  <a:pos x="T12" y="T13"/>
+                </a:cxn>
+              </a:cxnLst>
+              <a:rect l="T21" t="T22" r="T23" b="T24"/>
+              <a:pathLst>
+                <a:path w="404" h="1294">
+                  <a:moveTo>
+                    <a:pt x="404" y="771"/>
+                  </a:moveTo>
+                  <a:lnTo>
+                    <a:pt x="87" y="0"/>
+                  </a:lnTo>
+                  <a:lnTo>
+                    <a:pt x="224" y="574"/>
+                  </a:lnTo>
+                  <a:lnTo>
+                    <a:pt x="0" y="466"/>
+                  </a:lnTo>
+                  <a:lnTo>
+                    <a:pt x="301" y="1294"/>
+                  </a:lnTo>
+                  <a:lnTo>
+                    <a:pt x="155" y="686"/>
+                  </a:lnTo>
+                  <a:lnTo>
+                    <a:pt x="404" y="771"/>
+                  </a:lnTo>
+                  <a:close/>
+                </a:path>
+              </a:pathLst>
+            </a:custGeom>
+            <a:solidFill>
+              <a:schemeClr val="tx1"/>
+            </a:solidFill>
+            <a:ln w="3175">
+              <a:solidFill>
+                <a:schemeClr val="tx1">
+                  <a:lumMod val="95000"/>
+                  <a:lumOff val="5000"/>
+                </a:schemeClr>
+              </a:solidFill>
+              <a:round/>
+              <a:headEnd/>
+              <a:tailEnd/>
+            </a:ln>
+          </p:spPr>
+          <p:txBody>
+            <a:bodyPr wrap="none" anchor="ctr"/>
+            <a:lstStyle/>
+            <a:p>
+              <a:endParaRPr lang="en-US" sz="600" b="1">
+                <a:latin typeface="Heiti SC Medium" pitchFamily="2" charset="-128"/>
+                <a:ea typeface="Heiti SC Medium" pitchFamily="2" charset="-128"/>
+                <a:cs typeface="Heiti SC Light" charset="-122"/>
+              </a:endParaRPr>
+            </a:p>
+          </p:txBody>
+        </p:sp>
+        <p:grpSp>
+          <p:nvGrpSpPr>
+            <p:cNvPr id="2" name="Group 1"/>
+            <p:cNvGrpSpPr/>
+            <p:nvPr/>
+          </p:nvGrpSpPr>
+          <p:grpSpPr>
+            <a:xfrm>
+              <a:off x="1429622" y="558868"/>
+              <a:ext cx="401067" cy="184666"/>
+              <a:chOff x="2054746" y="899390"/>
+              <a:chExt cx="401067" cy="184666"/>
+            </a:xfrm>
+          </p:grpSpPr>
+          <p:sp>
+            <p:nvSpPr>
+              <p:cNvPr id="44" name="Rectangle 43"/>
+              <p:cNvSpPr/>
+              <p:nvPr/>
+            </p:nvSpPr>
+            <p:spPr>
+              <a:xfrm>
+                <a:off x="2068215" y="901741"/>
+                <a:ext cx="314100" cy="181712"/>
+              </a:xfrm>
+              <a:prstGeom prst="rect">
+                <a:avLst/>
+              </a:prstGeom>
+              <a:ln w="6350" cmpd="sng">
+                <a:solidFill>
+                  <a:srgbClr val="000000"/>
+                </a:solidFill>
+              </a:ln>
+              <a:effectLst/>
+            </p:spPr>
+            <p:style>
+              <a:lnRef idx="2">
+                <a:schemeClr val="dk1"/>
+              </a:lnRef>
+              <a:fillRef idx="1">
+                <a:schemeClr val="lt1"/>
+              </a:fillRef>
+              <a:effectRef idx="0">
+                <a:schemeClr val="dk1"/>
+              </a:effectRef>
+              <a:fontRef idx="minor">
+                <a:schemeClr val="dk1"/>
+              </a:fontRef>
+            </p:style>
+            <p:txBody>
+              <a:bodyPr lIns="39182" tIns="19591" rIns="39182" bIns="19591" spcCol="0" rtlCol="0" anchor="ctr"/>
+              <a:lstStyle/>
+              <a:p>
+                <a:pPr algn="ctr"/>
+                <a:endParaRPr lang="en-US" sz="600" b="1">
+                  <a:latin typeface="Heiti SC Medium" pitchFamily="2" charset="-128"/>
+                  <a:ea typeface="Heiti SC Medium" pitchFamily="2" charset="-128"/>
+                  <a:cs typeface="Heiti SC Light" charset="-122"/>
+                </a:endParaRPr>
+              </a:p>
+            </p:txBody>
+          </p:sp>
+          <p:sp>
+            <p:nvSpPr>
+              <p:cNvPr id="46" name="TextBox 45"/>
+              <p:cNvSpPr txBox="1"/>
+              <p:nvPr/>
+            </p:nvSpPr>
+            <p:spPr>
+              <a:xfrm>
+                <a:off x="2054746" y="899390"/>
+                <a:ext cx="401067" cy="184666"/>
+              </a:xfrm>
+              <a:prstGeom prst="rect">
+                <a:avLst/>
+              </a:prstGeom>
+              <a:noFill/>
+            </p:spPr>
+            <p:txBody>
+              <a:bodyPr wrap="square" rtlCol="0">
+                <a:spAutoFit/>
+              </a:bodyPr>
+              <a:lstStyle/>
+              <a:p>
+                <a:r>
+                  <a:rPr lang="en-US" sz="600" b="1" dirty="0">
+                    <a:latin typeface="Heiti SC Medium" pitchFamily="2" charset="-128"/>
+                    <a:ea typeface="Heiti SC Medium" pitchFamily="2" charset="-128"/>
+                    <a:cs typeface="Heiti SC Light" charset="-122"/>
+                  </a:rPr>
+                  <a:t>SGW</a:t>
+                </a:r>
+                <a:endParaRPr lang="en-US" sz="600" b="1" baseline="-25000" dirty="0">
+                  <a:latin typeface="Heiti SC Medium" pitchFamily="2" charset="-128"/>
+                  <a:ea typeface="Heiti SC Medium" pitchFamily="2" charset="-128"/>
+                  <a:cs typeface="Heiti SC Light" charset="-122"/>
+                </a:endParaRPr>
+              </a:p>
+            </p:txBody>
+          </p:sp>
+        </p:grpSp>
+        <p:grpSp>
+          <p:nvGrpSpPr>
+            <p:cNvPr id="56" name="Group 55"/>
+            <p:cNvGrpSpPr/>
+            <p:nvPr/>
+          </p:nvGrpSpPr>
+          <p:grpSpPr>
+            <a:xfrm>
+              <a:off x="1999396" y="561220"/>
+              <a:ext cx="388943" cy="184666"/>
+              <a:chOff x="2089909" y="869176"/>
+              <a:chExt cx="373791" cy="184411"/>
+            </a:xfrm>
+          </p:grpSpPr>
+          <p:sp>
+            <p:nvSpPr>
+              <p:cNvPr id="57" name="Rectangle 56"/>
+              <p:cNvSpPr/>
+              <p:nvPr/>
+            </p:nvSpPr>
+            <p:spPr>
+              <a:xfrm>
+                <a:off x="2118024" y="877582"/>
+                <a:ext cx="289509" cy="163744"/>
+              </a:xfrm>
+              <a:prstGeom prst="rect">
+                <a:avLst/>
+              </a:prstGeom>
+              <a:ln w="6350" cmpd="sng">
+                <a:solidFill>
+                  <a:srgbClr val="000000"/>
+                </a:solidFill>
+              </a:ln>
+              <a:effectLst/>
+            </p:spPr>
+            <p:style>
+              <a:lnRef idx="2">
+                <a:schemeClr val="dk1"/>
+              </a:lnRef>
+              <a:fillRef idx="1">
+                <a:schemeClr val="lt1"/>
+              </a:fillRef>
+              <a:effectRef idx="0">
+                <a:schemeClr val="dk1"/>
+              </a:effectRef>
+              <a:fontRef idx="minor">
+                <a:schemeClr val="dk1"/>
+              </a:fontRef>
+            </p:style>
+            <p:txBody>
+              <a:bodyPr lIns="39182" tIns="19591" rIns="39182" bIns="19591" spcCol="0" rtlCol="0" anchor="ctr"/>
+              <a:lstStyle/>
+              <a:p>
+                <a:pPr algn="ctr"/>
+                <a:endParaRPr lang="en-US" sz="600" b="1">
+                  <a:latin typeface="Heiti SC Medium" pitchFamily="2" charset="-128"/>
+                  <a:ea typeface="Heiti SC Medium" pitchFamily="2" charset="-128"/>
+                  <a:cs typeface="Heiti SC Light" charset="-122"/>
+                </a:endParaRPr>
+              </a:p>
+            </p:txBody>
+          </p:sp>
+          <p:sp>
+            <p:nvSpPr>
+              <p:cNvPr id="58" name="TextBox 57"/>
+              <p:cNvSpPr txBox="1"/>
+              <p:nvPr/>
+            </p:nvSpPr>
+            <p:spPr>
+              <a:xfrm>
+                <a:off x="2089909" y="869176"/>
+                <a:ext cx="373791" cy="184411"/>
+              </a:xfrm>
+              <a:prstGeom prst="rect">
+                <a:avLst/>
+              </a:prstGeom>
+              <a:noFill/>
+            </p:spPr>
+            <p:txBody>
+              <a:bodyPr wrap="square" rtlCol="0">
+                <a:spAutoFit/>
+              </a:bodyPr>
+              <a:lstStyle/>
+              <a:p>
+                <a:r>
+                  <a:rPr lang="en-US" sz="600" b="1" dirty="0">
+                    <a:latin typeface="Heiti SC Medium" pitchFamily="2" charset="-128"/>
+                    <a:ea typeface="Heiti SC Medium" pitchFamily="2" charset="-128"/>
+                    <a:cs typeface="Heiti SC Light" charset="-122"/>
+                  </a:rPr>
+                  <a:t>PGW</a:t>
+                </a:r>
+                <a:endParaRPr lang="en-US" sz="600" b="1" baseline="-25000" dirty="0">
+                  <a:latin typeface="Heiti SC Medium" pitchFamily="2" charset="-128"/>
+                  <a:ea typeface="Heiti SC Medium" pitchFamily="2" charset="-128"/>
+                  <a:cs typeface="Heiti SC Light" charset="-122"/>
+                </a:endParaRPr>
+              </a:p>
+            </p:txBody>
+          </p:sp>
+        </p:grpSp>
+        <p:cxnSp>
+          <p:nvCxnSpPr>
+            <p:cNvPr id="84" name="Straight Arrow Connector 83"/>
+            <p:cNvCxnSpPr>
+              <a:stCxn id="57" idx="1"/>
+              <a:endCxn id="44" idx="3"/>
+            </p:cNvCxnSpPr>
+            <p:nvPr/>
+          </p:nvCxnSpPr>
+          <p:spPr>
+            <a:xfrm flipH="1">
+              <a:off x="1757191" y="651623"/>
+              <a:ext cx="271460" cy="452"/>
+            </a:xfrm>
+            <a:prstGeom prst="straightConnector1">
+              <a:avLst/>
+            </a:prstGeom>
+            <a:ln w="6350">
+              <a:solidFill>
+                <a:schemeClr val="accent1"/>
+              </a:solidFill>
+              <a:headEnd type="none" w="sm" len="sm"/>
+              <a:tailEnd type="none" w="sm" len="sm"/>
+            </a:ln>
+            <a:effectLst/>
+          </p:spPr>
+          <p:style>
+            <a:lnRef idx="2">
+              <a:schemeClr val="accent1"/>
+            </a:lnRef>
+            <a:fillRef idx="0">
+              <a:schemeClr val="accent1"/>
+            </a:fillRef>
+            <a:effectRef idx="1">
+              <a:schemeClr val="accent1"/>
+            </a:effectRef>
+            <a:fontRef idx="minor">
+              <a:schemeClr val="tx1"/>
+            </a:fontRef>
+          </p:style>
+        </p:cxnSp>
+        <p:cxnSp>
+          <p:nvCxnSpPr>
+            <p:cNvPr id="104" name="Straight Connector 103"/>
+            <p:cNvCxnSpPr>
+              <a:stCxn id="63" idx="3"/>
+              <a:endCxn id="44" idx="1"/>
+            </p:cNvCxnSpPr>
             <p:nvPr/>
           </p:nvCxnSpPr>
           <p:spPr>
             <a:xfrm>
-              <a:off x="1124336" y="1437542"/>
-              <a:ext cx="184310" cy="1"/>
+              <a:off x="984088" y="590488"/>
+              <a:ext cx="459003" cy="61587"/>
             </a:xfrm>
             <a:prstGeom prst="line">
               <a:avLst/>
@@ -4818,467 +4711,539 @@
             </a:fontRef>
           </p:style>
         </p:cxnSp>
-        <p:sp>
-          <p:nvSpPr>
-            <p:cNvPr id="130" name="TextBox 129"/>
-            <p:cNvSpPr txBox="1"/>
+        <p:cxnSp>
+          <p:nvCxnSpPr>
+            <p:cNvPr id="107" name="Straight Connector 106"/>
+            <p:cNvCxnSpPr>
+              <a:stCxn id="62" idx="3"/>
+              <a:endCxn id="44" idx="1"/>
+            </p:cNvCxnSpPr>
             <p:nvPr/>
-          </p:nvSpPr>
+          </p:nvCxnSpPr>
           <p:spPr>
             <a:xfrm>
-              <a:off x="779984" y="1234089"/>
-              <a:ext cx="573414" cy="302434"/>
+              <a:off x="984513" y="351335"/>
+              <a:ext cx="458578" cy="300740"/>
             </a:xfrm>
-            <a:prstGeom prst="rect">
-              <a:avLst/>
-            </a:prstGeom>
-            <a:noFill/>
-          </p:spPr>
-          <p:txBody>
-            <a:bodyPr wrap="square" rtlCol="0">
-              <a:spAutoFit/>
-            </a:bodyPr>
-            <a:lstStyle/>
-            <a:p>
-              <a:r>
-                <a:rPr lang="en-US" sz="600" dirty="0">
-                  <a:solidFill>
-                    <a:schemeClr val="accent2">
-                      <a:lumMod val="75000"/>
-                    </a:schemeClr>
-                  </a:solidFill>
-                  <a:latin typeface="Heiti SC Light" charset="-122"/>
-                  <a:ea typeface="Heiti SC Light" charset="-122"/>
-                  <a:cs typeface="Heiti SC Light" charset="-122"/>
-                </a:rPr>
-                <a:t>Control</a:t>
-              </a:r>
-            </a:p>
-            <a:p>
-              <a:r>
-                <a:rPr lang="en-US" sz="600" dirty="0">
-                  <a:solidFill>
-                    <a:schemeClr val="accent1"/>
-                  </a:solidFill>
-                  <a:latin typeface="Heiti SC Light" charset="-122"/>
-                  <a:ea typeface="Heiti SC Light" charset="-122"/>
-                  <a:cs typeface="Heiti SC Light" charset="-122"/>
-                </a:rPr>
-                <a:t>Data</a:t>
-              </a:r>
-            </a:p>
-          </p:txBody>
-        </p:sp>
-      </p:grpSp>
-      <p:grpSp>
-        <p:nvGrpSpPr>
-          <p:cNvPr id="121" name="Group 120"/>
-          <p:cNvGrpSpPr/>
-          <p:nvPr/>
-        </p:nvGrpSpPr>
-        <p:grpSpPr>
-          <a:xfrm>
-            <a:off x="1935079" y="139947"/>
-            <a:ext cx="478230" cy="184666"/>
-            <a:chOff x="1847705" y="214870"/>
-            <a:chExt cx="478230" cy="184666"/>
-          </a:xfrm>
-        </p:grpSpPr>
-        <p:sp>
-          <p:nvSpPr>
-            <p:cNvPr id="105" name="Rectangle 104"/>
-            <p:cNvSpPr/>
-            <p:nvPr/>
-          </p:nvSpPr>
-          <p:spPr>
-            <a:xfrm>
-              <a:off x="1940529" y="217694"/>
-              <a:ext cx="292582" cy="170907"/>
-            </a:xfrm>
-            <a:prstGeom prst="rect">
+            <a:prstGeom prst="line">
               <a:avLst/>
             </a:prstGeom>
             <a:ln w="6350" cmpd="sng">
               <a:solidFill>
-                <a:srgbClr val="000000"/>
+                <a:schemeClr val="accent1"/>
               </a:solidFill>
             </a:ln>
             <a:effectLst/>
           </p:spPr>
           <p:style>
             <a:lnRef idx="2">
-              <a:schemeClr val="dk1"/>
+              <a:schemeClr val="accent1"/>
             </a:lnRef>
-            <a:fillRef idx="1">
-              <a:schemeClr val="lt1"/>
+            <a:fillRef idx="0">
+              <a:schemeClr val="accent1"/>
             </a:fillRef>
-            <a:effectRef idx="0">
-              <a:schemeClr val="dk1"/>
+            <a:effectRef idx="1">
+              <a:schemeClr val="accent1"/>
             </a:effectRef>
             <a:fontRef idx="minor">
-              <a:schemeClr val="dk1"/>
+              <a:schemeClr val="tx1"/>
             </a:fontRef>
           </p:style>
-          <p:txBody>
-            <a:bodyPr lIns="39182" tIns="19591" rIns="39182" bIns="19591" spcCol="0" rtlCol="0" anchor="ctr"/>
-            <a:lstStyle/>
-            <a:p>
-              <a:pPr algn="ctr"/>
-              <a:endParaRPr lang="en-US" sz="600">
-                <a:latin typeface="Heiti SC Light" charset="-122"/>
-                <a:ea typeface="Heiti SC Light" charset="-122"/>
-                <a:cs typeface="Heiti SC Light" charset="-122"/>
-              </a:endParaRPr>
-            </a:p>
-          </p:txBody>
-        </p:sp>
-        <p:sp>
-          <p:nvSpPr>
-            <p:cNvPr id="110" name="TextBox 109"/>
-            <p:cNvSpPr txBox="1"/>
+        </p:cxnSp>
+        <p:grpSp>
+          <p:nvGrpSpPr>
+            <p:cNvPr id="96" name="Group 95"/>
+            <p:cNvGrpSpPr/>
             <p:nvPr/>
-          </p:nvSpPr>
+          </p:nvGrpSpPr>
+          <p:grpSpPr>
+            <a:xfrm>
+              <a:off x="2260361" y="80210"/>
+              <a:ext cx="582328" cy="276999"/>
+              <a:chOff x="779984" y="1234089"/>
+              <a:chExt cx="573414" cy="302434"/>
+            </a:xfrm>
+          </p:grpSpPr>
+          <p:cxnSp>
+            <p:nvCxnSpPr>
+              <p:cNvPr id="125" name="Straight Connector 124"/>
+              <p:cNvCxnSpPr/>
+              <p:nvPr/>
+            </p:nvCxnSpPr>
+            <p:spPr>
+              <a:xfrm>
+                <a:off x="1152514" y="1340662"/>
+                <a:ext cx="182090" cy="0"/>
+              </a:xfrm>
+              <a:prstGeom prst="line">
+                <a:avLst/>
+              </a:prstGeom>
+              <a:ln w="6350" cmpd="sng">
+                <a:solidFill>
+                  <a:schemeClr val="accent2"/>
+                </a:solidFill>
+                <a:prstDash val="dash"/>
+              </a:ln>
+              <a:effectLst/>
+            </p:spPr>
+            <p:style>
+              <a:lnRef idx="2">
+                <a:schemeClr val="accent1"/>
+              </a:lnRef>
+              <a:fillRef idx="0">
+                <a:schemeClr val="accent1"/>
+              </a:fillRef>
+              <a:effectRef idx="1">
+                <a:schemeClr val="accent1"/>
+              </a:effectRef>
+              <a:fontRef idx="minor">
+                <a:schemeClr val="tx1"/>
+              </a:fontRef>
+            </p:style>
+          </p:cxnSp>
+          <p:cxnSp>
+            <p:nvCxnSpPr>
+              <p:cNvPr id="129" name="Straight Connector 128"/>
+              <p:cNvCxnSpPr/>
+              <p:nvPr/>
+            </p:nvCxnSpPr>
+            <p:spPr>
+              <a:xfrm>
+                <a:off x="1124336" y="1437542"/>
+                <a:ext cx="184310" cy="1"/>
+              </a:xfrm>
+              <a:prstGeom prst="line">
+                <a:avLst/>
+              </a:prstGeom>
+              <a:ln w="6350" cmpd="sng">
+                <a:solidFill>
+                  <a:schemeClr val="accent1"/>
+                </a:solidFill>
+              </a:ln>
+              <a:effectLst/>
+            </p:spPr>
+            <p:style>
+              <a:lnRef idx="2">
+                <a:schemeClr val="accent1"/>
+              </a:lnRef>
+              <a:fillRef idx="0">
+                <a:schemeClr val="accent1"/>
+              </a:fillRef>
+              <a:effectRef idx="1">
+                <a:schemeClr val="accent1"/>
+              </a:effectRef>
+              <a:fontRef idx="minor">
+                <a:schemeClr val="tx1"/>
+              </a:fontRef>
+            </p:style>
+          </p:cxnSp>
+          <p:sp>
+            <p:nvSpPr>
+              <p:cNvPr id="130" name="TextBox 129"/>
+              <p:cNvSpPr txBox="1"/>
+              <p:nvPr/>
+            </p:nvSpPr>
+            <p:spPr>
+              <a:xfrm>
+                <a:off x="779984" y="1234089"/>
+                <a:ext cx="573414" cy="302434"/>
+              </a:xfrm>
+              <a:prstGeom prst="rect">
+                <a:avLst/>
+              </a:prstGeom>
+              <a:noFill/>
+            </p:spPr>
+            <p:txBody>
+              <a:bodyPr wrap="square" rtlCol="0">
+                <a:spAutoFit/>
+              </a:bodyPr>
+              <a:lstStyle/>
+              <a:p>
+                <a:r>
+                  <a:rPr lang="en-US" sz="600" b="1" dirty="0">
+                    <a:solidFill>
+                      <a:schemeClr val="accent2">
+                        <a:lumMod val="75000"/>
+                      </a:schemeClr>
+                    </a:solidFill>
+                    <a:latin typeface="Heiti SC Medium" pitchFamily="2" charset="-128"/>
+                    <a:ea typeface="Heiti SC Medium" pitchFamily="2" charset="-128"/>
+                    <a:cs typeface="Heiti SC Light" charset="-122"/>
+                  </a:rPr>
+                  <a:t>Control</a:t>
+                </a:r>
+              </a:p>
+              <a:p>
+                <a:r>
+                  <a:rPr lang="en-US" sz="600" b="1" dirty="0">
+                    <a:solidFill>
+                      <a:schemeClr val="accent1"/>
+                    </a:solidFill>
+                    <a:latin typeface="Heiti SC Medium" pitchFamily="2" charset="-128"/>
+                    <a:ea typeface="Heiti SC Medium" pitchFamily="2" charset="-128"/>
+                    <a:cs typeface="Heiti SC Light" charset="-122"/>
+                  </a:rPr>
+                  <a:t>Data</a:t>
+                </a:r>
+              </a:p>
+            </p:txBody>
+          </p:sp>
+        </p:grpSp>
+        <p:grpSp>
+          <p:nvGrpSpPr>
+            <p:cNvPr id="121" name="Group 120"/>
+            <p:cNvGrpSpPr/>
+            <p:nvPr/>
+          </p:nvGrpSpPr>
+          <p:grpSpPr>
+            <a:xfrm>
+              <a:off x="1935079" y="139947"/>
+              <a:ext cx="478230" cy="184666"/>
+              <a:chOff x="1847705" y="214870"/>
+              <a:chExt cx="478230" cy="184666"/>
+            </a:xfrm>
+          </p:grpSpPr>
+          <p:sp>
+            <p:nvSpPr>
+              <p:cNvPr id="105" name="Rectangle 104"/>
+              <p:cNvSpPr/>
+              <p:nvPr/>
+            </p:nvSpPr>
+            <p:spPr>
+              <a:xfrm>
+                <a:off x="1940529" y="217694"/>
+                <a:ext cx="292582" cy="170907"/>
+              </a:xfrm>
+              <a:prstGeom prst="rect">
+                <a:avLst/>
+              </a:prstGeom>
+              <a:ln w="6350" cmpd="sng">
+                <a:solidFill>
+                  <a:srgbClr val="000000"/>
+                </a:solidFill>
+              </a:ln>
+              <a:effectLst/>
+            </p:spPr>
+            <p:style>
+              <a:lnRef idx="2">
+                <a:schemeClr val="dk1"/>
+              </a:lnRef>
+              <a:fillRef idx="1">
+                <a:schemeClr val="lt1"/>
+              </a:fillRef>
+              <a:effectRef idx="0">
+                <a:schemeClr val="dk1"/>
+              </a:effectRef>
+              <a:fontRef idx="minor">
+                <a:schemeClr val="dk1"/>
+              </a:fontRef>
+            </p:style>
+            <p:txBody>
+              <a:bodyPr lIns="39182" tIns="19591" rIns="39182" bIns="19591" spcCol="0" rtlCol="0" anchor="ctr"/>
+              <a:lstStyle/>
+              <a:p>
+                <a:pPr algn="ctr"/>
+                <a:endParaRPr lang="en-US" sz="600" b="1">
+                  <a:latin typeface="Heiti SC Medium" pitchFamily="2" charset="-128"/>
+                  <a:ea typeface="Heiti SC Medium" pitchFamily="2" charset="-128"/>
+                  <a:cs typeface="Heiti SC Light" charset="-122"/>
+                </a:endParaRPr>
+              </a:p>
+            </p:txBody>
+          </p:sp>
+          <p:sp>
+            <p:nvSpPr>
+              <p:cNvPr id="110" name="TextBox 109"/>
+              <p:cNvSpPr txBox="1"/>
+              <p:nvPr/>
+            </p:nvSpPr>
+            <p:spPr>
+              <a:xfrm>
+                <a:off x="1847705" y="214870"/>
+                <a:ext cx="478230" cy="184666"/>
+              </a:xfrm>
+              <a:prstGeom prst="rect">
+                <a:avLst/>
+              </a:prstGeom>
+              <a:noFill/>
+            </p:spPr>
+            <p:txBody>
+              <a:bodyPr wrap="square" rtlCol="0">
+                <a:spAutoFit/>
+              </a:bodyPr>
+              <a:lstStyle/>
+              <a:p>
+                <a:pPr algn="ctr"/>
+                <a:r>
+                  <a:rPr lang="en-US" sz="600" b="1" dirty="0">
+                    <a:latin typeface="Heiti SC Medium" pitchFamily="2" charset="-128"/>
+                    <a:ea typeface="Heiti SC Medium" pitchFamily="2" charset="-128"/>
+                    <a:cs typeface="Heiti SC Light" charset="-122"/>
+                  </a:rPr>
+                  <a:t>HSS</a:t>
+                </a:r>
+              </a:p>
+            </p:txBody>
+          </p:sp>
+        </p:grpSp>
+        <p:grpSp>
+          <p:nvGrpSpPr>
+            <p:cNvPr id="118" name="Group 117"/>
+            <p:cNvGrpSpPr/>
+            <p:nvPr/>
+          </p:nvGrpSpPr>
+          <p:grpSpPr>
+            <a:xfrm>
+              <a:off x="2438349" y="516991"/>
+              <a:ext cx="530610" cy="267464"/>
+              <a:chOff x="2368733" y="590302"/>
+              <a:chExt cx="530610" cy="267464"/>
+            </a:xfrm>
+          </p:grpSpPr>
+          <p:sp>
+            <p:nvSpPr>
+              <p:cNvPr id="137" name="Cloud 136"/>
+              <p:cNvSpPr/>
+              <p:nvPr/>
+            </p:nvSpPr>
+            <p:spPr>
+              <a:xfrm>
+                <a:off x="2429704" y="590302"/>
+                <a:ext cx="377659" cy="267464"/>
+              </a:xfrm>
+              <a:prstGeom prst="cloud">
+                <a:avLst/>
+              </a:prstGeom>
+              <a:noFill/>
+              <a:ln w="6350">
+                <a:solidFill>
+                  <a:schemeClr val="tx1">
+                    <a:lumMod val="85000"/>
+                    <a:lumOff val="15000"/>
+                  </a:schemeClr>
+                </a:solidFill>
+              </a:ln>
+              <a:effectLst/>
+            </p:spPr>
+            <p:style>
+              <a:lnRef idx="2">
+                <a:schemeClr val="accent1">
+                  <a:shade val="50000"/>
+                </a:schemeClr>
+              </a:lnRef>
+              <a:fillRef idx="1">
+                <a:schemeClr val="accent1"/>
+              </a:fillRef>
+              <a:effectRef idx="0">
+                <a:schemeClr val="accent1"/>
+              </a:effectRef>
+              <a:fontRef idx="minor">
+                <a:schemeClr val="lt1"/>
+              </a:fontRef>
+            </p:style>
+            <p:txBody>
+              <a:bodyPr rtlCol="0" anchor="ctr"/>
+              <a:lstStyle/>
+              <a:p>
+                <a:endParaRPr lang="en-US" sz="600" b="1">
+                  <a:latin typeface="Heiti SC Medium" pitchFamily="2" charset="-128"/>
+                  <a:ea typeface="Heiti SC Medium" pitchFamily="2" charset="-128"/>
+                  <a:cs typeface="Heiti SC Light" charset="-122"/>
+                </a:endParaRPr>
+              </a:p>
+            </p:txBody>
+          </p:sp>
+          <p:sp>
+            <p:nvSpPr>
+              <p:cNvPr id="140" name="TextBox 139"/>
+              <p:cNvSpPr txBox="1"/>
+              <p:nvPr/>
+            </p:nvSpPr>
+            <p:spPr>
+              <a:xfrm>
+                <a:off x="2368733" y="624565"/>
+                <a:ext cx="530610" cy="166442"/>
+              </a:xfrm>
+              <a:prstGeom prst="rect">
+                <a:avLst/>
+              </a:prstGeom>
+              <a:noFill/>
+            </p:spPr>
+            <p:txBody>
+              <a:bodyPr wrap="square" rtlCol="0">
+                <a:spAutoFit/>
+              </a:bodyPr>
+              <a:lstStyle/>
+              <a:p>
+                <a:r>
+                  <a:rPr lang="en-US" sz="600" b="1" dirty="0">
+                    <a:latin typeface="Heiti SC Medium" pitchFamily="2" charset="-128"/>
+                    <a:ea typeface="Heiti SC Medium" pitchFamily="2" charset="-128"/>
+                    <a:cs typeface="Heiti SC Light" charset="-122"/>
+                  </a:rPr>
+                  <a:t>Internet</a:t>
+                </a:r>
+                <a:endParaRPr lang="en-US" sz="600" b="1" baseline="-25000" dirty="0">
+                  <a:latin typeface="Heiti SC Medium" pitchFamily="2" charset="-128"/>
+                  <a:ea typeface="Heiti SC Medium" pitchFamily="2" charset="-128"/>
+                  <a:cs typeface="Heiti SC Light" charset="-122"/>
+                </a:endParaRPr>
+              </a:p>
+            </p:txBody>
+          </p:sp>
+        </p:grpSp>
+        <p:cxnSp>
+          <p:nvCxnSpPr>
+            <p:cNvPr id="142" name="Straight Connector 141"/>
+            <p:cNvCxnSpPr>
+              <a:stCxn id="57" idx="3"/>
+              <a:endCxn id="137" idx="2"/>
+            </p:cNvCxnSpPr>
+            <p:nvPr/>
+          </p:nvCxnSpPr>
           <p:spPr>
-            <a:xfrm>
-              <a:off x="1847705" y="214870"/>
-              <a:ext cx="478230" cy="184666"/>
+            <a:xfrm flipV="1">
+              <a:off x="2329896" y="650723"/>
+              <a:ext cx="170595" cy="900"/>
             </a:xfrm>
-            <a:prstGeom prst="rect">
+            <a:prstGeom prst="line">
               <a:avLst/>
             </a:prstGeom>
-            <a:noFill/>
-          </p:spPr>
-          <p:txBody>
-            <a:bodyPr wrap="square" rtlCol="0">
-              <a:spAutoFit/>
-            </a:bodyPr>
-            <a:lstStyle/>
-            <a:p>
-              <a:pPr algn="ctr"/>
-              <a:r>
-                <a:rPr lang="en-US" sz="600" dirty="0">
-                  <a:latin typeface="Heiti SC Light" charset="-122"/>
-                  <a:ea typeface="Heiti SC Light" charset="-122"/>
-                  <a:cs typeface="Heiti SC Light" charset="-122"/>
-                </a:rPr>
-                <a:t>HSS</a:t>
-              </a:r>
-            </a:p>
-          </p:txBody>
-        </p:sp>
-      </p:grpSp>
-      <p:grpSp>
-        <p:nvGrpSpPr>
-          <p:cNvPr id="118" name="Group 117"/>
-          <p:cNvGrpSpPr/>
-          <p:nvPr/>
-        </p:nvGrpSpPr>
-        <p:grpSpPr>
-          <a:xfrm>
-            <a:off x="2462713" y="516991"/>
-            <a:ext cx="481206" cy="267464"/>
-            <a:chOff x="2393097" y="590302"/>
-            <a:chExt cx="481206" cy="267464"/>
-          </a:xfrm>
-        </p:grpSpPr>
-        <p:sp>
-          <p:nvSpPr>
-            <p:cNvPr id="137" name="Cloud 136"/>
-            <p:cNvSpPr/>
-            <p:nvPr/>
-          </p:nvSpPr>
-          <p:spPr>
-            <a:xfrm>
-              <a:off x="2429704" y="590302"/>
-              <a:ext cx="377659" cy="267464"/>
-            </a:xfrm>
-            <a:prstGeom prst="cloud">
-              <a:avLst/>
-            </a:prstGeom>
-            <a:noFill/>
-            <a:ln w="6350">
+            <a:ln w="6350" cmpd="sng">
               <a:solidFill>
-                <a:schemeClr val="tx1">
-                  <a:lumMod val="85000"/>
-                  <a:lumOff val="15000"/>
-                </a:schemeClr>
+                <a:schemeClr val="accent1"/>
               </a:solidFill>
             </a:ln>
             <a:effectLst/>
           </p:spPr>
           <p:style>
             <a:lnRef idx="2">
-              <a:schemeClr val="accent1">
-                <a:shade val="50000"/>
-              </a:schemeClr>
+              <a:schemeClr val="accent1"/>
             </a:lnRef>
-            <a:fillRef idx="1">
+            <a:fillRef idx="0">
               <a:schemeClr val="accent1"/>
             </a:fillRef>
-            <a:effectRef idx="0">
+            <a:effectRef idx="1">
               <a:schemeClr val="accent1"/>
             </a:effectRef>
             <a:fontRef idx="minor">
-              <a:schemeClr val="lt1"/>
+              <a:schemeClr val="tx1"/>
             </a:fontRef>
           </p:style>
-          <p:txBody>
-            <a:bodyPr rtlCol="0" anchor="ctr"/>
-            <a:lstStyle/>
-            <a:p>
-              <a:endParaRPr lang="en-US" sz="600">
-                <a:latin typeface="Heiti SC Light" charset="-122"/>
-                <a:ea typeface="Heiti SC Light" charset="-122"/>
-                <a:cs typeface="Heiti SC Light" charset="-122"/>
-              </a:endParaRPr>
-            </a:p>
-          </p:txBody>
-        </p:sp>
+        </p:cxnSp>
+        <p:grpSp>
+          <p:nvGrpSpPr>
+            <p:cNvPr id="7" name="Group 6"/>
+            <p:cNvGrpSpPr/>
+            <p:nvPr/>
+          </p:nvGrpSpPr>
+          <p:grpSpPr>
+            <a:xfrm>
+              <a:off x="756109" y="-25386"/>
+              <a:ext cx="417788" cy="200055"/>
+              <a:chOff x="720385" y="-202048"/>
+              <a:chExt cx="357275" cy="200055"/>
+            </a:xfrm>
+          </p:grpSpPr>
+          <p:sp>
+            <p:nvSpPr>
+              <p:cNvPr id="289" name="TextBox 288"/>
+              <p:cNvSpPr txBox="1"/>
+              <p:nvPr/>
+            </p:nvSpPr>
+            <p:spPr>
+              <a:xfrm>
+                <a:off x="720385" y="-202048"/>
+                <a:ext cx="357275" cy="200055"/>
+              </a:xfrm>
+              <a:prstGeom prst="rect">
+                <a:avLst/>
+              </a:prstGeom>
+              <a:noFill/>
+            </p:spPr>
+            <p:txBody>
+              <a:bodyPr wrap="square" rtlCol="0">
+                <a:spAutoFit/>
+              </a:bodyPr>
+              <a:lstStyle/>
+              <a:p>
+                <a:pPr algn="ctr"/>
+                <a:r>
+                  <a:rPr lang="en-US" sz="700" b="1" dirty="0">
+                    <a:solidFill>
+                      <a:schemeClr val="accent2">
+                        <a:lumMod val="75000"/>
+                      </a:schemeClr>
+                    </a:solidFill>
+                    <a:latin typeface="Heiti SC Medium" pitchFamily="2" charset="-128"/>
+                    <a:ea typeface="Heiti SC Medium" pitchFamily="2" charset="-128"/>
+                    <a:cs typeface="Heiti SC Light" charset="-122"/>
+                  </a:rPr>
+                  <a:t>RAN</a:t>
+                </a:r>
+              </a:p>
+            </p:txBody>
+          </p:sp>
+          <p:sp>
+            <p:nvSpPr>
+              <p:cNvPr id="3" name="Rectangle 2"/>
+              <p:cNvSpPr/>
+              <p:nvPr/>
+            </p:nvSpPr>
+            <p:spPr>
+              <a:xfrm>
+                <a:off x="813296" y="-151730"/>
+                <a:ext cx="178951" cy="92075"/>
+              </a:xfrm>
+              <a:prstGeom prst="rect">
+                <a:avLst/>
+              </a:prstGeom>
+              <a:noFill/>
+              <a:ln w="3175">
+                <a:solidFill>
+                  <a:schemeClr val="tx1"/>
+                </a:solidFill>
+                <a:prstDash val="dash"/>
+              </a:ln>
+              <a:effectLst/>
+            </p:spPr>
+            <p:style>
+              <a:lnRef idx="1">
+                <a:schemeClr val="accent1"/>
+              </a:lnRef>
+              <a:fillRef idx="3">
+                <a:schemeClr val="accent1"/>
+              </a:fillRef>
+              <a:effectRef idx="2">
+                <a:schemeClr val="accent1"/>
+              </a:effectRef>
+              <a:fontRef idx="minor">
+                <a:schemeClr val="lt1"/>
+              </a:fontRef>
+            </p:style>
+            <p:txBody>
+              <a:bodyPr rtlCol="0" anchor="ctr"/>
+              <a:lstStyle/>
+              <a:p>
+                <a:pPr algn="ctr"/>
+                <a:endParaRPr lang="en-US" sz="700" b="1">
+                  <a:latin typeface="Heiti SC Medium" pitchFamily="2" charset="-128"/>
+                  <a:ea typeface="Heiti SC Medium" pitchFamily="2" charset="-128"/>
+                </a:endParaRPr>
+              </a:p>
+            </p:txBody>
+          </p:sp>
+        </p:grpSp>
         <p:sp>
           <p:nvSpPr>
-            <p:cNvPr id="140" name="TextBox 139"/>
-            <p:cNvSpPr txBox="1"/>
-            <p:nvPr/>
-          </p:nvSpPr>
-          <p:spPr>
-            <a:xfrm>
-              <a:off x="2393097" y="615399"/>
-              <a:ext cx="481206" cy="184666"/>
-            </a:xfrm>
-            <a:prstGeom prst="rect">
-              <a:avLst/>
-            </a:prstGeom>
-            <a:noFill/>
-          </p:spPr>
-          <p:txBody>
-            <a:bodyPr wrap="square" rtlCol="0">
-              <a:spAutoFit/>
-            </a:bodyPr>
-            <a:lstStyle/>
-            <a:p>
-              <a:r>
-                <a:rPr lang="en-US" sz="600" dirty="0">
-                  <a:latin typeface="Heiti SC Light" charset="-122"/>
-                  <a:ea typeface="Heiti SC Light" charset="-122"/>
-                  <a:cs typeface="Heiti SC Light" charset="-122"/>
-                </a:rPr>
-                <a:t>Internet</a:t>
-              </a:r>
-              <a:endParaRPr lang="en-US" sz="600" baseline="-25000" dirty="0">
-                <a:latin typeface="Heiti SC Light" charset="-122"/>
-                <a:ea typeface="Heiti SC Light" charset="-122"/>
-                <a:cs typeface="Heiti SC Light" charset="-122"/>
-              </a:endParaRPr>
-            </a:p>
-          </p:txBody>
-        </p:sp>
-      </p:grpSp>
-      <p:cxnSp>
-        <p:nvCxnSpPr>
-          <p:cNvPr id="142" name="Straight Connector 141"/>
-          <p:cNvCxnSpPr>
-            <a:stCxn id="57" idx="3"/>
-            <a:endCxn id="137" idx="2"/>
-          </p:cNvCxnSpPr>
-          <p:nvPr/>
-        </p:nvCxnSpPr>
-        <p:spPr>
-          <a:xfrm flipV="1">
-            <a:off x="2329896" y="650723"/>
-            <a:ext cx="170595" cy="900"/>
-          </a:xfrm>
-          <a:prstGeom prst="line">
-            <a:avLst/>
-          </a:prstGeom>
-          <a:ln w="6350" cmpd="sng">
-            <a:solidFill>
-              <a:schemeClr val="accent1"/>
-            </a:solidFill>
-          </a:ln>
-          <a:effectLst/>
-        </p:spPr>
-        <p:style>
-          <a:lnRef idx="2">
-            <a:schemeClr val="accent1"/>
-          </a:lnRef>
-          <a:fillRef idx="0">
-            <a:schemeClr val="accent1"/>
-          </a:fillRef>
-          <a:effectRef idx="1">
-            <a:schemeClr val="accent1"/>
-          </a:effectRef>
-          <a:fontRef idx="minor">
-            <a:schemeClr val="tx1"/>
-          </a:fontRef>
-        </p:style>
-      </p:cxnSp>
-      <p:grpSp>
-        <p:nvGrpSpPr>
-          <p:cNvPr id="7" name="Group 6"/>
-          <p:cNvGrpSpPr/>
-          <p:nvPr/>
-        </p:nvGrpSpPr>
-        <p:grpSpPr>
-          <a:xfrm>
-            <a:off x="756109" y="-25386"/>
-            <a:ext cx="417788" cy="307777"/>
-            <a:chOff x="720385" y="-202048"/>
-            <a:chExt cx="357275" cy="307777"/>
-          </a:xfrm>
-        </p:grpSpPr>
-        <p:sp>
-          <p:nvSpPr>
-            <p:cNvPr id="289" name="TextBox 288"/>
-            <p:cNvSpPr txBox="1"/>
-            <p:nvPr/>
-          </p:nvSpPr>
-          <p:spPr>
-            <a:xfrm>
-              <a:off x="720385" y="-202048"/>
-              <a:ext cx="357275" cy="307777"/>
-            </a:xfrm>
-            <a:prstGeom prst="rect">
-              <a:avLst/>
-            </a:prstGeom>
-            <a:noFill/>
-          </p:spPr>
-          <p:txBody>
-            <a:bodyPr wrap="square" rtlCol="0">
-              <a:spAutoFit/>
-            </a:bodyPr>
-            <a:lstStyle/>
-            <a:p>
-              <a:pPr algn="ctr"/>
-              <a:r>
-                <a:rPr lang="en-US" sz="700" b="1" dirty="0" smtClean="0">
-                  <a:solidFill>
-                    <a:schemeClr val="accent2">
-                      <a:lumMod val="75000"/>
-                    </a:schemeClr>
-                  </a:solidFill>
-                  <a:latin typeface="Heiti SC Light" charset="-122"/>
-                  <a:ea typeface="Heiti SC Light" charset="-122"/>
-                  <a:cs typeface="Heiti SC Light" charset="-122"/>
-                </a:rPr>
-                <a:t>RAN</a:t>
-              </a:r>
-            </a:p>
-          </p:txBody>
-        </p:sp>
-        <p:sp>
-          <p:nvSpPr>
-            <p:cNvPr id="3" name="Rectangle 2"/>
+            <p:cNvPr id="5" name="Rectangle 4"/>
             <p:cNvSpPr/>
             <p:nvPr/>
           </p:nvSpPr>
           <p:spPr>
             <a:xfrm>
-              <a:off x="813296" y="-151730"/>
-              <a:ext cx="178951" cy="92075"/>
-            </a:xfrm>
-            <a:prstGeom prst="rect">
-              <a:avLst/>
-            </a:prstGeom>
-            <a:noFill/>
-            <a:ln w="3175">
-              <a:solidFill>
-                <a:schemeClr val="tx1"/>
-              </a:solidFill>
-              <a:prstDash val="dash"/>
-            </a:ln>
-            <a:effectLst/>
-          </p:spPr>
-          <p:style>
-            <a:lnRef idx="1">
-              <a:schemeClr val="accent1"/>
-            </a:lnRef>
-            <a:fillRef idx="3">
-              <a:schemeClr val="accent1"/>
-            </a:fillRef>
-            <a:effectRef idx="2">
-              <a:schemeClr val="accent1"/>
-            </a:effectRef>
-            <a:fontRef idx="minor">
-              <a:schemeClr val="lt1"/>
-            </a:fontRef>
-          </p:style>
-          <p:txBody>
-            <a:bodyPr rtlCol="0" anchor="ctr"/>
-            <a:lstStyle/>
-            <a:p>
-              <a:pPr algn="ctr"/>
-              <a:endParaRPr lang="en-US" sz="700"/>
-            </a:p>
-          </p:txBody>
-        </p:sp>
-      </p:grpSp>
-      <p:sp>
-        <p:nvSpPr>
-          <p:cNvPr id="5" name="Rectangle 4"/>
-          <p:cNvSpPr/>
-          <p:nvPr/>
-        </p:nvSpPr>
-        <p:spPr>
-          <a:xfrm>
-            <a:off x="684155" y="63780"/>
-            <a:ext cx="519694" cy="184666"/>
-          </a:xfrm>
-          <a:prstGeom prst="rect">
-            <a:avLst/>
-          </a:prstGeom>
-        </p:spPr>
-        <p:txBody>
-          <a:bodyPr wrap="none">
-            <a:spAutoFit/>
-          </a:bodyPr>
-          <a:lstStyle/>
-          <a:p>
-            <a:pPr algn="ctr"/>
-            <a:r>
-              <a:rPr lang="en-US" sz="600">
-                <a:latin typeface="Heiti SC Light" charset="-122"/>
-                <a:ea typeface="Heiti SC Light" charset="-122"/>
-                <a:cs typeface="Heiti SC Light" charset="-122"/>
-              </a:rPr>
-              <a:t>eNodeBs</a:t>
-            </a:r>
-            <a:endParaRPr lang="en-US" sz="600" dirty="0">
-              <a:solidFill>
-                <a:schemeClr val="accent2">
-                  <a:lumMod val="75000"/>
-                </a:schemeClr>
-              </a:solidFill>
-              <a:latin typeface="Heiti SC Light" charset="-122"/>
-              <a:ea typeface="Heiti SC Light" charset="-122"/>
-              <a:cs typeface="Heiti SC Light" charset="-122"/>
-            </a:endParaRPr>
-          </a:p>
-        </p:txBody>
-      </p:sp>
-      <p:grpSp>
-        <p:nvGrpSpPr>
-          <p:cNvPr id="10" name="Group 9"/>
-          <p:cNvGrpSpPr/>
-          <p:nvPr/>
-        </p:nvGrpSpPr>
-        <p:grpSpPr>
-          <a:xfrm>
-            <a:off x="1678793" y="355440"/>
-            <a:ext cx="405432" cy="200055"/>
-            <a:chOff x="1699777" y="304738"/>
-            <a:chExt cx="359394" cy="200055"/>
-          </a:xfrm>
-        </p:grpSpPr>
-        <p:sp>
-          <p:nvSpPr>
-            <p:cNvPr id="6" name="Rectangle 5"/>
-            <p:cNvSpPr/>
-            <p:nvPr/>
-          </p:nvSpPr>
-          <p:spPr>
-            <a:xfrm>
-              <a:off x="1699777" y="304738"/>
-              <a:ext cx="359394" cy="200055"/>
+              <a:off x="684155" y="63780"/>
+              <a:ext cx="519694" cy="184666"/>
             </a:xfrm>
             <a:prstGeom prst="rect">
               <a:avLst/>
@@ -5292,74 +5257,137 @@
             <a:p>
               <a:pPr algn="ctr"/>
               <a:r>
-                <a:rPr lang="en-US" sz="700" b="1" dirty="0" smtClean="0">
+                <a:rPr lang="en-US" sz="600" b="1">
+                  <a:latin typeface="Heiti SC Medium" pitchFamily="2" charset="-128"/>
+                  <a:ea typeface="Heiti SC Medium" pitchFamily="2" charset="-128"/>
+                  <a:cs typeface="Heiti SC Light" charset="-122"/>
+                </a:rPr>
+                <a:t>eNodeBs</a:t>
+              </a:r>
+              <a:endParaRPr lang="en-US" sz="600" b="1" dirty="0">
+                <a:solidFill>
+                  <a:schemeClr val="accent2">
+                    <a:lumMod val="75000"/>
+                  </a:schemeClr>
+                </a:solidFill>
+                <a:latin typeface="Heiti SC Medium" pitchFamily="2" charset="-128"/>
+                <a:ea typeface="Heiti SC Medium" pitchFamily="2" charset="-128"/>
+                <a:cs typeface="Heiti SC Light" charset="-122"/>
+              </a:endParaRPr>
+            </a:p>
+          </p:txBody>
+        </p:sp>
+        <p:grpSp>
+          <p:nvGrpSpPr>
+            <p:cNvPr id="10" name="Group 9"/>
+            <p:cNvGrpSpPr/>
+            <p:nvPr/>
+          </p:nvGrpSpPr>
+          <p:grpSpPr>
+            <a:xfrm>
+              <a:off x="1701811" y="355440"/>
+              <a:ext cx="359393" cy="200055"/>
+              <a:chOff x="1720182" y="304738"/>
+              <a:chExt cx="318583" cy="200055"/>
+            </a:xfrm>
+          </p:grpSpPr>
+          <p:sp>
+            <p:nvSpPr>
+              <p:cNvPr id="6" name="Rectangle 5"/>
+              <p:cNvSpPr/>
+              <p:nvPr/>
+            </p:nvSpPr>
+            <p:spPr>
+              <a:xfrm>
+                <a:off x="1720182" y="304738"/>
+                <a:ext cx="318583" cy="200055"/>
+              </a:xfrm>
+              <a:prstGeom prst="rect">
+                <a:avLst/>
+              </a:prstGeom>
+            </p:spPr>
+            <p:txBody>
+              <a:bodyPr wrap="none">
+                <a:spAutoFit/>
+              </a:bodyPr>
+              <a:lstStyle/>
+              <a:p>
+                <a:pPr algn="ctr"/>
+                <a:r>
+                  <a:rPr lang="en-US" sz="700" b="1" dirty="0">
+                    <a:solidFill>
+                      <a:schemeClr val="accent2">
+                        <a:lumMod val="75000"/>
+                      </a:schemeClr>
+                    </a:solidFill>
+                    <a:latin typeface="Heiti SC Medium" pitchFamily="2" charset="-128"/>
+                    <a:ea typeface="Heiti SC Medium" pitchFamily="2" charset="-128"/>
+                    <a:cs typeface="Heiti SC Light" charset="-122"/>
+                  </a:rPr>
+                  <a:t>EPC</a:t>
+                </a:r>
+                <a:endParaRPr lang="en-US" sz="700" b="1" dirty="0">
                   <a:solidFill>
                     <a:schemeClr val="accent2">
                       <a:lumMod val="75000"/>
                     </a:schemeClr>
                   </a:solidFill>
-                  <a:latin typeface="Heiti SC Light" charset="-122"/>
-                  <a:ea typeface="Heiti SC Light" charset="-122"/>
-                  <a:cs typeface="Heiti SC Light" charset="-122"/>
-                </a:rPr>
-                <a:t>EPC</a:t>
-              </a:r>
-              <a:endParaRPr lang="en-US" sz="700" b="1" dirty="0">
+                  <a:latin typeface="Heiti SC Medium" pitchFamily="2" charset="-128"/>
+                  <a:ea typeface="Heiti SC Medium" pitchFamily="2" charset="-128"/>
+                </a:endParaRPr>
+              </a:p>
+            </p:txBody>
+          </p:sp>
+          <p:sp>
+            <p:nvSpPr>
+              <p:cNvPr id="65" name="Rectangle 64"/>
+              <p:cNvSpPr/>
+              <p:nvPr/>
+            </p:nvSpPr>
+            <p:spPr>
+              <a:xfrm>
+                <a:off x="1785822" y="348549"/>
+                <a:ext cx="178951" cy="92075"/>
+              </a:xfrm>
+              <a:prstGeom prst="rect">
+                <a:avLst/>
+              </a:prstGeom>
+              <a:noFill/>
+              <a:ln w="3175">
                 <a:solidFill>
-                  <a:schemeClr val="accent2">
-                    <a:lumMod val="75000"/>
-                  </a:schemeClr>
+                  <a:schemeClr val="tx1"/>
                 </a:solidFill>
-              </a:endParaRPr>
-            </a:p>
-          </p:txBody>
-        </p:sp>
-        <p:sp>
-          <p:nvSpPr>
-            <p:cNvPr id="65" name="Rectangle 64"/>
-            <p:cNvSpPr/>
-            <p:nvPr/>
-          </p:nvSpPr>
-          <p:spPr>
-            <a:xfrm>
-              <a:off x="1785822" y="348549"/>
-              <a:ext cx="178951" cy="92075"/>
-            </a:xfrm>
-            <a:prstGeom prst="rect">
-              <a:avLst/>
-            </a:prstGeom>
-            <a:noFill/>
-            <a:ln w="3175">
-              <a:solidFill>
-                <a:schemeClr val="tx1"/>
-              </a:solidFill>
-              <a:prstDash val="dash"/>
-            </a:ln>
-            <a:effectLst/>
-          </p:spPr>
-          <p:style>
-            <a:lnRef idx="1">
-              <a:schemeClr val="accent1"/>
-            </a:lnRef>
-            <a:fillRef idx="3">
-              <a:schemeClr val="accent1"/>
-            </a:fillRef>
-            <a:effectRef idx="2">
-              <a:schemeClr val="accent1"/>
-            </a:effectRef>
-            <a:fontRef idx="minor">
-              <a:schemeClr val="lt1"/>
-            </a:fontRef>
-          </p:style>
-          <p:txBody>
-            <a:bodyPr rtlCol="0" anchor="ctr"/>
-            <a:lstStyle/>
-            <a:p>
-              <a:pPr algn="ctr"/>
-              <a:endParaRPr lang="en-US" sz="700"/>
-            </a:p>
-          </p:txBody>
-        </p:sp>
+                <a:prstDash val="dash"/>
+              </a:ln>
+              <a:effectLst/>
+            </p:spPr>
+            <p:style>
+              <a:lnRef idx="1">
+                <a:schemeClr val="accent1"/>
+              </a:lnRef>
+              <a:fillRef idx="3">
+                <a:schemeClr val="accent1"/>
+              </a:fillRef>
+              <a:effectRef idx="2">
+                <a:schemeClr val="accent1"/>
+              </a:effectRef>
+              <a:fontRef idx="minor">
+                <a:schemeClr val="lt1"/>
+              </a:fontRef>
+            </p:style>
+            <p:txBody>
+              <a:bodyPr rtlCol="0" anchor="ctr"/>
+              <a:lstStyle/>
+              <a:p>
+                <a:pPr algn="ctr"/>
+                <a:endParaRPr lang="en-US" sz="700" b="1">
+                  <a:latin typeface="Heiti SC Medium" pitchFamily="2" charset="-128"/>
+                  <a:ea typeface="Heiti SC Medium" pitchFamily="2" charset="-128"/>
+                </a:endParaRPr>
+              </a:p>
+            </p:txBody>
+          </p:sp>
+        </p:grpSp>
       </p:grpSp>
     </p:spTree>
     <p:extLst>

</xml_diff>